<commit_message>
first final version - waiting skills in design
</commit_message>
<xml_diff>
--- a/Presentation/BC7107_Schowing.pptx
+++ b/Presentation/BC7107_Schowing.pptx
@@ -199,7 +199,7 @@
           <a:p>
             <a:fld id="{837851E2-4F80-458A-82DA-3FEE6873B106}" type="datetimeFigureOut">
               <a:rPr lang="fr-CH" smtClean="0"/>
-              <a:t>11.01.2020</a:t>
+              <a:t>21.01.2020</a:t>
             </a:fld>
             <a:endParaRPr lang="fr-CH"/>
           </a:p>
@@ -708,52 +708,6 @@
           <a:p>
             <a:r>
               <a:rPr lang="fr-CH" dirty="0"/>
-              <a:t>GAI – </a:t>
-            </a:r>
-            <a:r>
-              <a:rPr lang="fr-CH" dirty="0" err="1"/>
-              <a:t>Giberellic</a:t>
-            </a:r>
-            <a:r>
-              <a:rPr lang="fr-CH" dirty="0"/>
-              <a:t> Acid </a:t>
-            </a:r>
-            <a:r>
-              <a:rPr lang="fr-CH" dirty="0" err="1"/>
-              <a:t>Insensitive</a:t>
-            </a:r>
-            <a:r>
-              <a:rPr lang="fr-CH" dirty="0"/>
-              <a:t> – Plants </a:t>
-            </a:r>
-            <a:r>
-              <a:rPr lang="fr-CH" dirty="0" err="1"/>
-              <a:t>deficients</a:t>
-            </a:r>
-            <a:r>
-              <a:rPr lang="fr-CH" dirty="0"/>
-              <a:t> in </a:t>
-            </a:r>
-            <a:r>
-              <a:rPr lang="fr-CH" dirty="0" err="1"/>
-              <a:t>biosynthesis</a:t>
-            </a:r>
-            <a:r>
-              <a:rPr lang="fr-CH" dirty="0"/>
-              <a:t> of </a:t>
-            </a:r>
-            <a:r>
-              <a:rPr lang="fr-CH" dirty="0" err="1"/>
-              <a:t>Giberellic</a:t>
-            </a:r>
-            <a:r>
-              <a:rPr lang="fr-CH" dirty="0"/>
-              <a:t> Acid </a:t>
-            </a:r>
-          </a:p>
-          <a:p>
-            <a:r>
-              <a:rPr lang="fr-CH" dirty="0"/>
               <a:t>Modulation of plant </a:t>
             </a:r>
             <a:r>
@@ -778,11 +732,200 @@
             </a:r>
             <a:r>
               <a:rPr lang="fr-CH" dirty="0"/>
-              <a:t> to GA</a:t>
-            </a:r>
-          </a:p>
-          <a:p>
+              <a:t> to GA </a:t>
+            </a:r>
+            <a:r>
+              <a:rPr lang="fr-CH" b="1" dirty="0"/>
+              <a:t>(GA </a:t>
+            </a:r>
+            <a:r>
+              <a:rPr lang="fr-CH" b="1" dirty="0" err="1"/>
+              <a:t>promotes</a:t>
+            </a:r>
+            <a:r>
+              <a:rPr lang="fr-CH" b="1" dirty="0"/>
+              <a:t> </a:t>
+            </a:r>
+            <a:r>
+              <a:rPr lang="fr-CH" b="1" dirty="0" err="1"/>
+              <a:t>growth</a:t>
+            </a:r>
+            <a:r>
+              <a:rPr lang="fr-CH" b="1" dirty="0"/>
+              <a:t>)</a:t>
+            </a:r>
+            <a:r>
+              <a:rPr lang="fr-CH" b="0" dirty="0"/>
+              <a:t> </a:t>
+            </a:r>
+            <a:endParaRPr lang="fr-CH" b="1" dirty="0"/>
+          </a:p>
+          <a:p>
+            <a:r>
+              <a:rPr lang="fr-CH" dirty="0"/>
+              <a:t>Mutation in DELLA-</a:t>
+            </a:r>
+            <a:r>
+              <a:rPr lang="fr-CH" dirty="0" err="1"/>
+              <a:t>domain</a:t>
+            </a:r>
+            <a:r>
+              <a:rPr lang="fr-CH" dirty="0"/>
+              <a:t> </a:t>
+            </a:r>
+            <a:r>
+              <a:rPr lang="fr-CH" dirty="0" err="1"/>
+              <a:t>prevents</a:t>
+            </a:r>
+            <a:r>
+              <a:rPr lang="fr-CH" dirty="0"/>
+              <a:t> DELLA </a:t>
+            </a:r>
+            <a:r>
+              <a:rPr lang="fr-CH" dirty="0" err="1"/>
+              <a:t>from</a:t>
+            </a:r>
+            <a:r>
+              <a:rPr lang="fr-CH" dirty="0"/>
+              <a:t> binding to GA-</a:t>
+            </a:r>
+            <a:r>
+              <a:rPr lang="fr-CH" dirty="0" err="1"/>
+              <a:t>loaded</a:t>
+            </a:r>
+            <a:r>
+              <a:rPr lang="fr-CH" dirty="0"/>
+              <a:t> GID1 and </a:t>
+            </a:r>
+            <a:r>
+              <a:rPr lang="fr-CH" dirty="0" err="1"/>
+              <a:t>renders</a:t>
+            </a:r>
+            <a:r>
+              <a:rPr lang="fr-CH" dirty="0"/>
+              <a:t> </a:t>
+            </a:r>
+            <a:r>
+              <a:rPr lang="fr-CH" dirty="0" err="1"/>
+              <a:t>it</a:t>
+            </a:r>
+            <a:r>
+              <a:rPr lang="fr-CH" dirty="0"/>
+              <a:t> </a:t>
+            </a:r>
+            <a:r>
+              <a:rPr lang="fr-CH" dirty="0" err="1"/>
+              <a:t>resistant</a:t>
+            </a:r>
+            <a:r>
+              <a:rPr lang="fr-CH" dirty="0"/>
+              <a:t> to </a:t>
+            </a:r>
+            <a:r>
+              <a:rPr lang="fr-CH" dirty="0" err="1"/>
+              <a:t>degradation</a:t>
+            </a:r>
+            <a:r>
+              <a:rPr lang="fr-CH" dirty="0"/>
+              <a:t> -&gt; </a:t>
+            </a:r>
+            <a:r>
+              <a:rPr lang="fr-CH" b="1" dirty="0"/>
+              <a:t>gain-of-</a:t>
+            </a:r>
+            <a:r>
+              <a:rPr lang="fr-CH" b="1" dirty="0" err="1"/>
+              <a:t>function</a:t>
+            </a:r>
+            <a:r>
+              <a:rPr lang="fr-CH" b="0" dirty="0"/>
+              <a:t>, </a:t>
+            </a:r>
             <a:endParaRPr lang="fr-CH" dirty="0"/>
+          </a:p>
+          <a:p>
+            <a:r>
+              <a:rPr lang="fr-CH" dirty="0"/>
+              <a:t>Mutation in GRAS-</a:t>
+            </a:r>
+            <a:r>
+              <a:rPr lang="fr-CH" dirty="0" err="1"/>
+              <a:t>domain</a:t>
+            </a:r>
+            <a:r>
+              <a:rPr lang="fr-CH" dirty="0"/>
+              <a:t> </a:t>
+            </a:r>
+            <a:r>
+              <a:rPr lang="fr-CH" dirty="0" err="1"/>
+              <a:t>may</a:t>
+            </a:r>
+            <a:r>
+              <a:rPr lang="fr-CH" dirty="0"/>
+              <a:t> lead to an inactive </a:t>
+            </a:r>
+            <a:r>
+              <a:rPr lang="fr-CH" dirty="0" err="1"/>
+              <a:t>protein</a:t>
+            </a:r>
+            <a:r>
+              <a:rPr lang="fr-CH" dirty="0"/>
+              <a:t>, </a:t>
+            </a:r>
+            <a:r>
+              <a:rPr lang="fr-CH" dirty="0" err="1"/>
+              <a:t>cannot</a:t>
+            </a:r>
+            <a:r>
+              <a:rPr lang="fr-CH" dirty="0"/>
+              <a:t> </a:t>
+            </a:r>
+            <a:r>
+              <a:rPr lang="fr-CH" dirty="0" err="1"/>
+              <a:t>repress</a:t>
+            </a:r>
+            <a:r>
+              <a:rPr lang="fr-CH" dirty="0"/>
+              <a:t> TF -&gt; </a:t>
+            </a:r>
+            <a:r>
+              <a:rPr lang="fr-CH" b="1" dirty="0" err="1"/>
+              <a:t>loss</a:t>
+            </a:r>
+            <a:r>
+              <a:rPr lang="fr-CH" b="1" dirty="0"/>
+              <a:t> of </a:t>
+            </a:r>
+            <a:r>
+              <a:rPr lang="fr-CH" b="1" dirty="0" err="1"/>
+              <a:t>function</a:t>
+            </a:r>
+            <a:endParaRPr lang="fr-CH" dirty="0"/>
+          </a:p>
+          <a:p>
+            <a:endParaRPr lang="fr-CH" dirty="0"/>
+          </a:p>
+          <a:p>
+            <a:r>
+              <a:rPr lang="fr-CH" dirty="0"/>
+              <a:t>Inactive or </a:t>
+            </a:r>
+            <a:r>
+              <a:rPr lang="fr-CH" dirty="0" err="1"/>
+              <a:t>resistent</a:t>
+            </a:r>
+            <a:r>
+              <a:rPr lang="fr-CH" dirty="0"/>
+              <a:t> to </a:t>
+            </a:r>
+            <a:r>
+              <a:rPr lang="fr-CH" dirty="0" err="1"/>
+              <a:t>degradation</a:t>
+            </a:r>
+            <a:r>
+              <a:rPr lang="fr-CH" dirty="0"/>
+              <a:t> </a:t>
+            </a:r>
           </a:p>
         </p:txBody>
       </p:sp>
@@ -813,6 +956,105 @@
     <p:extLst>
       <p:ext uri="{BB962C8B-B14F-4D97-AF65-F5344CB8AC3E}">
         <p14:creationId xmlns:p14="http://schemas.microsoft.com/office/powerpoint/2010/main" val="3783833451"/>
+      </p:ext>
+    </p:extLst>
+  </p:cSld>
+  <p:clrMapOvr>
+    <a:masterClrMapping/>
+  </p:clrMapOvr>
+</p:notes>
+</file>
+
+<file path=ppt/notesSlides/notesSlide3.xml><?xml version="1.0" encoding="utf-8"?>
+<p:notes xmlns:a="http://schemas.openxmlformats.org/drawingml/2006/main" xmlns:r="http://schemas.openxmlformats.org/officeDocument/2006/relationships" xmlns:p="http://schemas.openxmlformats.org/presentationml/2006/main">
+  <p:cSld>
+    <p:spTree>
+      <p:nvGrpSpPr>
+        <p:cNvPr id="1" name=""/>
+        <p:cNvGrpSpPr/>
+        <p:nvPr/>
+      </p:nvGrpSpPr>
+      <p:grpSpPr>
+        <a:xfrm>
+          <a:off x="0" y="0"/>
+          <a:ext cx="0" cy="0"/>
+          <a:chOff x="0" y="0"/>
+          <a:chExt cx="0" cy="0"/>
+        </a:xfrm>
+      </p:grpSpPr>
+      <p:sp>
+        <p:nvSpPr>
+          <p:cNvPr id="2" name="Espace réservé de l'image des diapositives 1"/>
+          <p:cNvSpPr>
+            <a:spLocks noGrp="1" noRot="1" noChangeAspect="1"/>
+          </p:cNvSpPr>
+          <p:nvPr>
+            <p:ph type="sldImg"/>
+          </p:nvPr>
+        </p:nvSpPr>
+        <p:spPr/>
+      </p:sp>
+      <p:sp>
+        <p:nvSpPr>
+          <p:cNvPr id="3" name="Espace réservé des notes 2"/>
+          <p:cNvSpPr>
+            <a:spLocks noGrp="1"/>
+          </p:cNvSpPr>
+          <p:nvPr>
+            <p:ph type="body" idx="1"/>
+          </p:nvPr>
+        </p:nvSpPr>
+        <p:spPr/>
+        <p:txBody>
+          <a:bodyPr/>
+          <a:lstStyle/>
+          <a:p>
+            <a:r>
+              <a:rPr lang="en-GB" dirty="0"/>
+              <a:t>Here we try to find what causes the activity shown in the zymography. </a:t>
+            </a:r>
+          </a:p>
+          <a:p>
+            <a:r>
+              <a:rPr lang="en-GB" dirty="0"/>
+              <a:t>After having sequenced, assembled and annotated their genome, we compared them and found that the strains showing the activity possess a Lysin pseudogene that might produce a protein with a matching molecular weight. </a:t>
+            </a:r>
+          </a:p>
+          <a:p>
+            <a:endParaRPr lang="en-GB" dirty="0"/>
+          </a:p>
+          <a:p>
+            <a:endParaRPr lang="en-GB" dirty="0"/>
+          </a:p>
+        </p:txBody>
+      </p:sp>
+      <p:sp>
+        <p:nvSpPr>
+          <p:cNvPr id="4" name="Espace réservé du numéro de diapositive 3"/>
+          <p:cNvSpPr>
+            <a:spLocks noGrp="1"/>
+          </p:cNvSpPr>
+          <p:nvPr>
+            <p:ph type="sldNum" sz="quarter" idx="5"/>
+          </p:nvPr>
+        </p:nvSpPr>
+        <p:spPr/>
+        <p:txBody>
+          <a:bodyPr/>
+          <a:lstStyle/>
+          <a:p>
+            <a:fld id="{D6139E6F-7A80-4686-83D5-3D60AE3F6DD8}" type="slidenum">
+              <a:rPr lang="fr-CH" smtClean="0"/>
+              <a:t>3</a:t>
+            </a:fld>
+            <a:endParaRPr lang="fr-CH"/>
+          </a:p>
+        </p:txBody>
+      </p:sp>
+    </p:spTree>
+    <p:extLst>
+      <p:ext uri="{BB962C8B-B14F-4D97-AF65-F5344CB8AC3E}">
+        <p14:creationId xmlns:p14="http://schemas.microsoft.com/office/powerpoint/2010/main" val="2452225864"/>
       </p:ext>
     </p:extLst>
   </p:cSld>
@@ -971,7 +1213,7 @@
           <a:p>
             <a:fld id="{8AC31CE9-DC4A-423F-9343-8758E8045185}" type="datetimeFigureOut">
               <a:rPr lang="en-GB" smtClean="0"/>
-              <a:t>11/01/2020</a:t>
+              <a:t>21/01/2020</a:t>
             </a:fld>
             <a:endParaRPr lang="en-GB"/>
           </a:p>
@@ -1171,7 +1413,7 @@
           <a:p>
             <a:fld id="{8AC31CE9-DC4A-423F-9343-8758E8045185}" type="datetimeFigureOut">
               <a:rPr lang="en-GB" smtClean="0"/>
-              <a:t>11/01/2020</a:t>
+              <a:t>21/01/2020</a:t>
             </a:fld>
             <a:endParaRPr lang="en-GB"/>
           </a:p>
@@ -1381,7 +1623,7 @@
           <a:p>
             <a:fld id="{8AC31CE9-DC4A-423F-9343-8758E8045185}" type="datetimeFigureOut">
               <a:rPr lang="en-GB" smtClean="0"/>
-              <a:t>11/01/2020</a:t>
+              <a:t>21/01/2020</a:t>
             </a:fld>
             <a:endParaRPr lang="en-GB"/>
           </a:p>
@@ -1581,7 +1823,7 @@
           <a:p>
             <a:fld id="{8AC31CE9-DC4A-423F-9343-8758E8045185}" type="datetimeFigureOut">
               <a:rPr lang="en-GB" smtClean="0"/>
-              <a:t>11/01/2020</a:t>
+              <a:t>21/01/2020</a:t>
             </a:fld>
             <a:endParaRPr lang="en-GB"/>
           </a:p>
@@ -1857,7 +2099,7 @@
           <a:p>
             <a:fld id="{8AC31CE9-DC4A-423F-9343-8758E8045185}" type="datetimeFigureOut">
               <a:rPr lang="en-GB" smtClean="0"/>
-              <a:t>11/01/2020</a:t>
+              <a:t>21/01/2020</a:t>
             </a:fld>
             <a:endParaRPr lang="en-GB"/>
           </a:p>
@@ -2125,7 +2367,7 @@
           <a:p>
             <a:fld id="{8AC31CE9-DC4A-423F-9343-8758E8045185}" type="datetimeFigureOut">
               <a:rPr lang="en-GB" smtClean="0"/>
-              <a:t>11/01/2020</a:t>
+              <a:t>21/01/2020</a:t>
             </a:fld>
             <a:endParaRPr lang="en-GB"/>
           </a:p>
@@ -2540,7 +2782,7 @@
           <a:p>
             <a:fld id="{8AC31CE9-DC4A-423F-9343-8758E8045185}" type="datetimeFigureOut">
               <a:rPr lang="en-GB" smtClean="0"/>
-              <a:t>11/01/2020</a:t>
+              <a:t>21/01/2020</a:t>
             </a:fld>
             <a:endParaRPr lang="en-GB"/>
           </a:p>
@@ -2682,7 +2924,7 @@
           <a:p>
             <a:fld id="{8AC31CE9-DC4A-423F-9343-8758E8045185}" type="datetimeFigureOut">
               <a:rPr lang="en-GB" smtClean="0"/>
-              <a:t>11/01/2020</a:t>
+              <a:t>21/01/2020</a:t>
             </a:fld>
             <a:endParaRPr lang="en-GB"/>
           </a:p>
@@ -2795,7 +3037,7 @@
           <a:p>
             <a:fld id="{8AC31CE9-DC4A-423F-9343-8758E8045185}" type="datetimeFigureOut">
               <a:rPr lang="en-GB" smtClean="0"/>
-              <a:t>11/01/2020</a:t>
+              <a:t>21/01/2020</a:t>
             </a:fld>
             <a:endParaRPr lang="en-GB"/>
           </a:p>
@@ -3108,7 +3350,7 @@
           <a:p>
             <a:fld id="{8AC31CE9-DC4A-423F-9343-8758E8045185}" type="datetimeFigureOut">
               <a:rPr lang="en-GB" smtClean="0"/>
-              <a:t>11/01/2020</a:t>
+              <a:t>21/01/2020</a:t>
             </a:fld>
             <a:endParaRPr lang="en-GB"/>
           </a:p>
@@ -3397,7 +3639,7 @@
           <a:p>
             <a:fld id="{8AC31CE9-DC4A-423F-9343-8758E8045185}" type="datetimeFigureOut">
               <a:rPr lang="en-GB" smtClean="0"/>
-              <a:t>11/01/2020</a:t>
+              <a:t>21/01/2020</a:t>
             </a:fld>
             <a:endParaRPr lang="en-GB"/>
           </a:p>
@@ -3640,7 +3882,7 @@
           <a:p>
             <a:fld id="{8AC31CE9-DC4A-423F-9343-8758E8045185}" type="datetimeFigureOut">
               <a:rPr lang="en-GB" smtClean="0"/>
-              <a:t>11/01/2020</a:t>
+              <a:t>21/01/2020</a:t>
             </a:fld>
             <a:endParaRPr lang="en-GB"/>
           </a:p>
@@ -4202,13 +4444,7 @@
           <a:prstGeom prst="line">
             <a:avLst/>
           </a:prstGeom>
-          <a:ln w="12700">
-            <a:solidFill>
-              <a:schemeClr val="accent3">
-                <a:lumMod val="75000"/>
-              </a:schemeClr>
-            </a:solidFill>
-          </a:ln>
+          <a:ln/>
         </p:spPr>
         <p:style>
           <a:lnRef idx="1">
@@ -6089,6 +6325,41 @@
               <a:t>genes</a:t>
             </a:r>
             <a:endParaRPr lang="fr-CH" dirty="0"/>
+          </a:p>
+        </p:txBody>
+      </p:sp>
+      <p:sp>
+        <p:nvSpPr>
+          <p:cNvPr id="3" name="ZoneTexte 2">
+            <a:extLst>
+              <a:ext uri="{FF2B5EF4-FFF2-40B4-BE49-F238E27FC236}">
+                <a16:creationId xmlns:a16="http://schemas.microsoft.com/office/drawing/2014/main" id="{EC17A7A6-8E25-4C76-A206-EC4D11CF2FF1}"/>
+              </a:ext>
+            </a:extLst>
+          </p:cNvPr>
+          <p:cNvSpPr txBox="1"/>
+          <p:nvPr/>
+        </p:nvSpPr>
+        <p:spPr>
+          <a:xfrm>
+            <a:off x="9668449" y="6517778"/>
+            <a:ext cx="2523551" cy="276999"/>
+          </a:xfrm>
+          <a:prstGeom prst="rect">
+            <a:avLst/>
+          </a:prstGeom>
+          <a:noFill/>
+        </p:spPr>
+        <p:txBody>
+          <a:bodyPr wrap="square" rtlCol="0">
+            <a:spAutoFit/>
+          </a:bodyPr>
+          <a:lstStyle/>
+          <a:p>
+            <a:r>
+              <a:rPr lang="en-GB" sz="1200" dirty="0"/>
+              <a:t>Thibault Schowing, BC.7107, HS2019</a:t>
+            </a:r>
           </a:p>
         </p:txBody>
       </p:sp>
@@ -6174,12 +6445,8 @@
           <a:p>
             <a:pPr algn="ctr"/>
             <a:r>
-              <a:rPr lang="en-US" sz="3600" dirty="0" err="1"/>
-              <a:t>Identication</a:t>
-            </a:r>
-            <a:r>
               <a:rPr lang="en-US" sz="3600" dirty="0"/>
-              <a:t> of gai phenotype revertant mutations in </a:t>
+              <a:t>Identification of gai phenotype revertant mutations in </a:t>
             </a:r>
             <a:r>
               <a:rPr lang="fr-CH" sz="3600" i="1" dirty="0"/>
@@ -6202,8 +6469,8 @@
         </p:nvSpPr>
         <p:spPr>
           <a:xfrm>
-            <a:off x="123825" y="1619250"/>
-            <a:ext cx="5668343" cy="5078313"/>
+            <a:off x="123825" y="1600200"/>
+            <a:ext cx="5781675" cy="5170646"/>
           </a:xfrm>
           <a:prstGeom prst="rect">
             <a:avLst/>
@@ -6365,7 +6632,24 @@
             </a:endParaRPr>
           </a:p>
           <a:p>
-            <a:endParaRPr lang="fr-CH" u="sng" dirty="0">
+            <a:endParaRPr lang="en-GB" u="sng" dirty="0">
+              <a:solidFill>
+                <a:srgbClr val="003300"/>
+              </a:solidFill>
+            </a:endParaRPr>
+          </a:p>
+          <a:p>
+            <a:r>
+              <a:rPr lang="fr-CH" sz="2000" b="1" dirty="0">
+                <a:solidFill>
+                  <a:srgbClr val="003300"/>
+                </a:solidFill>
+              </a:rPr>
+              <a:t>Gar12</a:t>
+            </a:r>
+          </a:p>
+          <a:p>
+            <a:endParaRPr lang="fr-CH" dirty="0">
               <a:solidFill>
                 <a:srgbClr val="003300"/>
               </a:solidFill>
@@ -6378,24 +6662,7 @@
                   <a:srgbClr val="003300"/>
                 </a:solidFill>
               </a:rPr>
-              <a:t>Gar12: </a:t>
-            </a:r>
-          </a:p>
-          <a:p>
-            <a:endParaRPr lang="fr-CH" dirty="0">
-              <a:solidFill>
-                <a:srgbClr val="003300"/>
-              </a:solidFill>
-            </a:endParaRPr>
-          </a:p>
-          <a:p>
-            <a:r>
-              <a:rPr lang="fr-CH" dirty="0">
-                <a:solidFill>
-                  <a:srgbClr val="003300"/>
-                </a:solidFill>
-              </a:rPr>
-              <a:t>Original </a:t>
+              <a:t>• Original </a:t>
             </a:r>
             <a:r>
               <a:rPr lang="fr-CH" dirty="0" err="1">
@@ -6427,7 +6694,7 @@
                   <a:srgbClr val="003300"/>
                 </a:solidFill>
               </a:rPr>
-              <a:t> -&gt; </a:t>
+              <a:t>: </a:t>
             </a:r>
             <a:r>
               <a:rPr lang="fr-CH" dirty="0" err="1">
@@ -6539,7 +6806,7 @@
                   <a:srgbClr val="003300"/>
                 </a:solidFill>
               </a:rPr>
-              <a:t> -&gt; </a:t>
+              <a:t>         </a:t>
             </a:r>
             <a:r>
               <a:rPr lang="fr-CH" dirty="0" err="1">
@@ -6556,6 +6823,23 @@
             </a:endParaRPr>
           </a:p>
           <a:p>
+            <a:endParaRPr lang="en-GB" dirty="0">
+              <a:solidFill>
+                <a:srgbClr val="003300"/>
+              </a:solidFill>
+            </a:endParaRPr>
+          </a:p>
+          <a:p>
+            <a:r>
+              <a:rPr lang="fr-CH" sz="2000" b="1" dirty="0">
+                <a:solidFill>
+                  <a:srgbClr val="003300"/>
+                </a:solidFill>
+              </a:rPr>
+              <a:t>Gar13</a:t>
+            </a:r>
+          </a:p>
+          <a:p>
             <a:endParaRPr lang="fr-CH" dirty="0">
               <a:solidFill>
                 <a:srgbClr val="003300"/>
@@ -6569,24 +6853,7 @@
                   <a:srgbClr val="003300"/>
                 </a:solidFill>
               </a:rPr>
-              <a:t>Gar13: </a:t>
-            </a:r>
-          </a:p>
-          <a:p>
-            <a:endParaRPr lang="fr-CH" dirty="0">
-              <a:solidFill>
-                <a:srgbClr val="003300"/>
-              </a:solidFill>
-            </a:endParaRPr>
-          </a:p>
-          <a:p>
-            <a:r>
-              <a:rPr lang="fr-CH" dirty="0">
-                <a:solidFill>
-                  <a:srgbClr val="003300"/>
-                </a:solidFill>
-              </a:rPr>
-              <a:t>Original 51bp </a:t>
+              <a:t>• Original 51bp </a:t>
             </a:r>
             <a:r>
               <a:rPr lang="fr-CH" dirty="0" err="1">
@@ -6604,6 +6871,14 @@
           </a:p>
           <a:p>
             <a:r>
+              <a:rPr lang="fr-CH" dirty="0">
+                <a:solidFill>
+                  <a:srgbClr val="003300"/>
+                </a:solidFill>
+              </a:rPr>
+              <a:t>• </a:t>
+            </a:r>
+            <a:r>
               <a:rPr lang="fr-CH" dirty="0" err="1">
                 <a:solidFill>
                   <a:srgbClr val="003300"/>
@@ -6643,6 +6918,22 @@
               </a:rPr>
               <a:t>domain</a:t>
             </a:r>
+            <a:r>
+              <a:rPr lang="fr-CH" dirty="0">
+                <a:solidFill>
+                  <a:srgbClr val="003300"/>
+                </a:solidFill>
+              </a:rPr>
+              <a:t>         </a:t>
+            </a:r>
+            <a:r>
+              <a:rPr lang="fr-CH" dirty="0" err="1">
+                <a:solidFill>
+                  <a:srgbClr val="003300"/>
+                </a:solidFill>
+              </a:rPr>
+              <a:t>growth</a:t>
+            </a:r>
             <a:endParaRPr lang="fr-CH" dirty="0">
               <a:solidFill>
                 <a:srgbClr val="003300"/>
@@ -6658,12 +6949,12 @@
           </a:p>
           <a:p>
             <a:r>
-              <a:rPr lang="fr-CH" dirty="0">
+              <a:rPr lang="fr-CH" sz="2000" b="1" dirty="0">
                 <a:solidFill>
                   <a:srgbClr val="003300"/>
                 </a:solidFill>
               </a:rPr>
-              <a:t>Gar12 &amp; Gar13:</a:t>
+              <a:t>Gar12 &amp; Gar13</a:t>
             </a:r>
           </a:p>
           <a:p>
@@ -6818,8 +7109,8 @@
         </p:blipFill>
         <p:spPr>
           <a:xfrm>
-            <a:off x="3231890" y="5557420"/>
-            <a:ext cx="384656" cy="512034"/>
+            <a:off x="3033107" y="6004317"/>
+            <a:ext cx="284660" cy="378924"/>
           </a:xfrm>
           <a:prstGeom prst="rect">
             <a:avLst/>
@@ -6848,7 +7139,7 @@
         </p:blipFill>
         <p:spPr>
           <a:xfrm>
-            <a:off x="5585373" y="3000653"/>
+            <a:off x="5625129" y="3033783"/>
             <a:ext cx="646324" cy="1310196"/>
           </a:xfrm>
           <a:prstGeom prst="rect">
@@ -6878,8 +7169,8 @@
         </p:blipFill>
         <p:spPr>
           <a:xfrm>
-            <a:off x="5590602" y="4382056"/>
-            <a:ext cx="591511" cy="1310196"/>
+            <a:off x="5676741" y="4448316"/>
+            <a:ext cx="531902" cy="1178161"/>
           </a:xfrm>
           <a:prstGeom prst="rect">
             <a:avLst/>
@@ -6927,6 +7218,284 @@
           </a:prstGeom>
         </p:spPr>
       </p:pic>
+      <p:sp>
+        <p:nvSpPr>
+          <p:cNvPr id="8" name="Rectangle 7">
+            <a:extLst>
+              <a:ext uri="{FF2B5EF4-FFF2-40B4-BE49-F238E27FC236}">
+                <a16:creationId xmlns:a16="http://schemas.microsoft.com/office/drawing/2014/main" id="{CE51349F-5FA6-4055-BEBE-6450BB8BB82D}"/>
+              </a:ext>
+            </a:extLst>
+          </p:cNvPr>
+          <p:cNvSpPr/>
+          <p:nvPr/>
+        </p:nvSpPr>
+        <p:spPr>
+          <a:xfrm>
+            <a:off x="123825" y="3000653"/>
+            <a:ext cx="6184415" cy="1381403"/>
+          </a:xfrm>
+          <a:prstGeom prst="rect">
+            <a:avLst/>
+          </a:prstGeom>
+          <a:noFill/>
+        </p:spPr>
+        <p:style>
+          <a:lnRef idx="2">
+            <a:schemeClr val="accent1">
+              <a:shade val="50000"/>
+            </a:schemeClr>
+          </a:lnRef>
+          <a:fillRef idx="1">
+            <a:schemeClr val="accent1"/>
+          </a:fillRef>
+          <a:effectRef idx="0">
+            <a:schemeClr val="accent1"/>
+          </a:effectRef>
+          <a:fontRef idx="minor">
+            <a:schemeClr val="lt1"/>
+          </a:fontRef>
+        </p:style>
+        <p:txBody>
+          <a:bodyPr rtlCol="0" anchor="ctr"/>
+          <a:lstStyle/>
+          <a:p>
+            <a:pPr algn="ctr"/>
+            <a:endParaRPr lang="en-GB"/>
+          </a:p>
+        </p:txBody>
+      </p:sp>
+      <p:sp>
+        <p:nvSpPr>
+          <p:cNvPr id="10" name="Rectangle 9">
+            <a:extLst>
+              <a:ext uri="{FF2B5EF4-FFF2-40B4-BE49-F238E27FC236}">
+                <a16:creationId xmlns:a16="http://schemas.microsoft.com/office/drawing/2014/main" id="{BB3D78BA-8042-432B-97E0-54A09272467C}"/>
+              </a:ext>
+            </a:extLst>
+          </p:cNvPr>
+          <p:cNvSpPr/>
+          <p:nvPr/>
+        </p:nvSpPr>
+        <p:spPr>
+          <a:xfrm>
+            <a:off x="126430" y="4415186"/>
+            <a:ext cx="6184415" cy="1310196"/>
+          </a:xfrm>
+          <a:prstGeom prst="rect">
+            <a:avLst/>
+          </a:prstGeom>
+          <a:noFill/>
+          <a:ln>
+            <a:solidFill>
+              <a:srgbClr val="00B050"/>
+            </a:solidFill>
+          </a:ln>
+        </p:spPr>
+        <p:style>
+          <a:lnRef idx="2">
+            <a:schemeClr val="accent1">
+              <a:shade val="50000"/>
+            </a:schemeClr>
+          </a:lnRef>
+          <a:fillRef idx="1">
+            <a:schemeClr val="accent1"/>
+          </a:fillRef>
+          <a:effectRef idx="0">
+            <a:schemeClr val="accent1"/>
+          </a:effectRef>
+          <a:fontRef idx="minor">
+            <a:schemeClr val="lt1"/>
+          </a:fontRef>
+        </p:style>
+        <p:txBody>
+          <a:bodyPr rtlCol="0" anchor="ctr"/>
+          <a:lstStyle/>
+          <a:p>
+            <a:pPr algn="ctr"/>
+            <a:endParaRPr lang="en-GB"/>
+          </a:p>
+        </p:txBody>
+      </p:sp>
+      <p:sp>
+        <p:nvSpPr>
+          <p:cNvPr id="11" name="Rectangle 10">
+            <a:extLst>
+              <a:ext uri="{FF2B5EF4-FFF2-40B4-BE49-F238E27FC236}">
+                <a16:creationId xmlns:a16="http://schemas.microsoft.com/office/drawing/2014/main" id="{13768C2C-8CA0-4E0D-A205-161C6C6F9EF1}"/>
+              </a:ext>
+            </a:extLst>
+          </p:cNvPr>
+          <p:cNvSpPr/>
+          <p:nvPr/>
+        </p:nvSpPr>
+        <p:spPr>
+          <a:xfrm>
+            <a:off x="123824" y="5746524"/>
+            <a:ext cx="6184415" cy="1007387"/>
+          </a:xfrm>
+          <a:prstGeom prst="rect">
+            <a:avLst/>
+          </a:prstGeom>
+          <a:noFill/>
+          <a:ln>
+            <a:solidFill>
+              <a:schemeClr val="accent3"/>
+            </a:solidFill>
+          </a:ln>
+        </p:spPr>
+        <p:style>
+          <a:lnRef idx="2">
+            <a:schemeClr val="accent1">
+              <a:shade val="50000"/>
+            </a:schemeClr>
+          </a:lnRef>
+          <a:fillRef idx="1">
+            <a:schemeClr val="accent1"/>
+          </a:fillRef>
+          <a:effectRef idx="0">
+            <a:schemeClr val="accent1"/>
+          </a:effectRef>
+          <a:fontRef idx="minor">
+            <a:schemeClr val="lt1"/>
+          </a:fontRef>
+        </p:style>
+        <p:txBody>
+          <a:bodyPr rtlCol="0" anchor="ctr"/>
+          <a:lstStyle/>
+          <a:p>
+            <a:pPr algn="ctr"/>
+            <a:endParaRPr lang="en-GB"/>
+          </a:p>
+        </p:txBody>
+      </p:sp>
+      <p:sp>
+        <p:nvSpPr>
+          <p:cNvPr id="13" name="Flèche : droite rayée 12">
+            <a:extLst>
+              <a:ext uri="{FF2B5EF4-FFF2-40B4-BE49-F238E27FC236}">
+                <a16:creationId xmlns:a16="http://schemas.microsoft.com/office/drawing/2014/main" id="{B89C35C0-7C9A-4900-87BA-D73BE1859EE1}"/>
+              </a:ext>
+            </a:extLst>
+          </p:cNvPr>
+          <p:cNvSpPr/>
+          <p:nvPr/>
+        </p:nvSpPr>
+        <p:spPr>
+          <a:xfrm>
+            <a:off x="4161472" y="3931359"/>
+            <a:ext cx="320040" cy="216058"/>
+          </a:xfrm>
+          <a:prstGeom prst="stripedRightArrow">
+            <a:avLst/>
+          </a:prstGeom>
+        </p:spPr>
+        <p:style>
+          <a:lnRef idx="2">
+            <a:schemeClr val="accent3">
+              <a:shade val="50000"/>
+            </a:schemeClr>
+          </a:lnRef>
+          <a:fillRef idx="1">
+            <a:schemeClr val="accent3"/>
+          </a:fillRef>
+          <a:effectRef idx="0">
+            <a:schemeClr val="accent3"/>
+          </a:effectRef>
+          <a:fontRef idx="minor">
+            <a:schemeClr val="lt1"/>
+          </a:fontRef>
+        </p:style>
+        <p:txBody>
+          <a:bodyPr rtlCol="0" anchor="ctr"/>
+          <a:lstStyle/>
+          <a:p>
+            <a:pPr algn="ctr"/>
+            <a:endParaRPr lang="en-GB"/>
+          </a:p>
+        </p:txBody>
+      </p:sp>
+      <p:sp>
+        <p:nvSpPr>
+          <p:cNvPr id="14" name="Flèche : droite rayée 13">
+            <a:extLst>
+              <a:ext uri="{FF2B5EF4-FFF2-40B4-BE49-F238E27FC236}">
+                <a16:creationId xmlns:a16="http://schemas.microsoft.com/office/drawing/2014/main" id="{F25CAFBE-8F85-4B93-8F04-DAF9D8EB3C90}"/>
+              </a:ext>
+            </a:extLst>
+          </p:cNvPr>
+          <p:cNvSpPr/>
+          <p:nvPr/>
+        </p:nvSpPr>
+        <p:spPr>
+          <a:xfrm>
+            <a:off x="3841432" y="5324705"/>
+            <a:ext cx="320040" cy="216058"/>
+          </a:xfrm>
+          <a:prstGeom prst="stripedRightArrow">
+            <a:avLst/>
+          </a:prstGeom>
+        </p:spPr>
+        <p:style>
+          <a:lnRef idx="2">
+            <a:schemeClr val="accent3">
+              <a:shade val="50000"/>
+            </a:schemeClr>
+          </a:lnRef>
+          <a:fillRef idx="1">
+            <a:schemeClr val="accent3"/>
+          </a:fillRef>
+          <a:effectRef idx="0">
+            <a:schemeClr val="accent3"/>
+          </a:effectRef>
+          <a:fontRef idx="minor">
+            <a:schemeClr val="lt1"/>
+          </a:fontRef>
+        </p:style>
+        <p:txBody>
+          <a:bodyPr rtlCol="0" anchor="ctr"/>
+          <a:lstStyle/>
+          <a:p>
+            <a:pPr algn="ctr"/>
+            <a:endParaRPr lang="en-GB"/>
+          </a:p>
+        </p:txBody>
+      </p:sp>
+      <p:sp>
+        <p:nvSpPr>
+          <p:cNvPr id="15" name="ZoneTexte 14">
+            <a:extLst>
+              <a:ext uri="{FF2B5EF4-FFF2-40B4-BE49-F238E27FC236}">
+                <a16:creationId xmlns:a16="http://schemas.microsoft.com/office/drawing/2014/main" id="{090AB612-E68D-4886-854C-95500237641C}"/>
+              </a:ext>
+            </a:extLst>
+          </p:cNvPr>
+          <p:cNvSpPr txBox="1"/>
+          <p:nvPr/>
+        </p:nvSpPr>
+        <p:spPr>
+          <a:xfrm>
+            <a:off x="9668449" y="6517778"/>
+            <a:ext cx="2523551" cy="276999"/>
+          </a:xfrm>
+          <a:prstGeom prst="rect">
+            <a:avLst/>
+          </a:prstGeom>
+          <a:noFill/>
+        </p:spPr>
+        <p:txBody>
+          <a:bodyPr wrap="square" rtlCol="0">
+            <a:spAutoFit/>
+          </a:bodyPr>
+          <a:lstStyle/>
+          <a:p>
+            <a:r>
+              <a:rPr lang="en-GB" sz="1200" dirty="0"/>
+              <a:t>Thibault Schowing, BC.7107, HS2019</a:t>
+            </a:r>
+          </a:p>
+        </p:txBody>
+      </p:sp>
     </p:spTree>
     <p:extLst>
       <p:ext uri="{BB962C8B-B14F-4D97-AF65-F5344CB8AC3E}">
@@ -7038,7 +7607,7 @@
           <p:nvPr/>
         </p:nvPicPr>
         <p:blipFill>
-          <a:blip r:embed="rId2">
+          <a:blip r:embed="rId3">
             <a:clrChange>
               <a:clrFrom>
                 <a:srgbClr val="FFFFFF"/>
@@ -7263,7 +7832,7 @@
               <a:t>): enzymes </a:t>
             </a:r>
             <a:r>
-              <a:rPr lang="fr-CH" dirty="0" err="1"/>
+              <a:rPr lang="en-GB" dirty="0"/>
               <a:t>used</a:t>
             </a:r>
             <a:r>
@@ -7271,7 +7840,7 @@
               <a:t> in </a:t>
             </a:r>
             <a:r>
-              <a:rPr lang="fr-CH" dirty="0" err="1"/>
+              <a:rPr lang="en-GB" dirty="0"/>
               <a:t>cheese</a:t>
             </a:r>
             <a:r>
@@ -7292,36 +7861,6 @@
             <a:extLst>
               <a:ext uri="{FF2B5EF4-FFF2-40B4-BE49-F238E27FC236}">
                 <a16:creationId xmlns:a16="http://schemas.microsoft.com/office/drawing/2014/main" id="{732D0C61-9B20-4659-AC60-46D2798F80C4}"/>
-              </a:ext>
-            </a:extLst>
-          </p:cNvPr>
-          <p:cNvPicPr>
-            <a:picLocks noChangeAspect="1"/>
-          </p:cNvPicPr>
-          <p:nvPr/>
-        </p:nvPicPr>
-        <p:blipFill>
-          <a:blip r:embed="rId3"/>
-          <a:stretch>
-            <a:fillRect/>
-          </a:stretch>
-        </p:blipFill>
-        <p:spPr>
-          <a:xfrm>
-            <a:off x="735846" y="3671898"/>
-            <a:ext cx="976230" cy="976230"/>
-          </a:xfrm>
-          <a:prstGeom prst="rect">
-            <a:avLst/>
-          </a:prstGeom>
-        </p:spPr>
-      </p:pic>
-      <p:pic>
-        <p:nvPicPr>
-          <p:cNvPr id="18" name="Image 17">
-            <a:extLst>
-              <a:ext uri="{FF2B5EF4-FFF2-40B4-BE49-F238E27FC236}">
-                <a16:creationId xmlns:a16="http://schemas.microsoft.com/office/drawing/2014/main" id="{6A174524-EF97-47A8-A030-014B2C91C1C2}"/>
               </a:ext>
             </a:extLst>
           </p:cNvPr>
@@ -7338,7 +7877,7 @@
         </p:blipFill>
         <p:spPr>
           <a:xfrm>
-            <a:off x="735846" y="4749162"/>
+            <a:off x="1878846" y="4207736"/>
             <a:ext cx="976230" cy="976230"/>
           </a:xfrm>
           <a:prstGeom prst="rect">
@@ -7346,284 +7885,12 @@
           </a:prstGeom>
         </p:spPr>
       </p:pic>
-      <p:sp>
-        <p:nvSpPr>
-          <p:cNvPr id="19" name="ZoneTexte 18">
-            <a:extLst>
-              <a:ext uri="{FF2B5EF4-FFF2-40B4-BE49-F238E27FC236}">
-                <a16:creationId xmlns:a16="http://schemas.microsoft.com/office/drawing/2014/main" id="{BD434ACE-4D77-4A6D-985F-5AEF701E94DD}"/>
-              </a:ext>
-            </a:extLst>
-          </p:cNvPr>
-          <p:cNvSpPr txBox="1"/>
-          <p:nvPr/>
-        </p:nvSpPr>
-        <p:spPr>
-          <a:xfrm>
-            <a:off x="5429250" y="2818710"/>
-            <a:ext cx="5807730" cy="369332"/>
-          </a:xfrm>
-          <a:prstGeom prst="rect">
-            <a:avLst/>
-          </a:prstGeom>
-          <a:noFill/>
-        </p:spPr>
-        <p:txBody>
-          <a:bodyPr wrap="square" rtlCol="0">
-            <a:spAutoFit/>
-          </a:bodyPr>
-          <a:lstStyle/>
-          <a:p>
-            <a:r>
-              <a:rPr lang="fr-CH" dirty="0"/>
-              <a:t>New </a:t>
-            </a:r>
-            <a:r>
-              <a:rPr lang="fr-CH" dirty="0" err="1"/>
-              <a:t>gene</a:t>
-            </a:r>
-            <a:r>
-              <a:rPr lang="fr-CH" dirty="0"/>
-              <a:t> in a group or </a:t>
-            </a:r>
-            <a:r>
-              <a:rPr lang="fr-CH" dirty="0" err="1"/>
-              <a:t>loss</a:t>
-            </a:r>
-            <a:r>
-              <a:rPr lang="fr-CH" dirty="0"/>
-              <a:t> of </a:t>
-            </a:r>
-            <a:r>
-              <a:rPr lang="fr-CH" dirty="0" err="1"/>
-              <a:t>gene</a:t>
-            </a:r>
-            <a:r>
-              <a:rPr lang="fr-CH" dirty="0"/>
-              <a:t> </a:t>
-            </a:r>
-            <a:r>
-              <a:rPr lang="fr-CH" dirty="0" err="1"/>
-              <a:t>product</a:t>
-            </a:r>
-            <a:r>
-              <a:rPr lang="fr-CH" dirty="0"/>
-              <a:t> in the </a:t>
-            </a:r>
-            <a:r>
-              <a:rPr lang="fr-CH" dirty="0" err="1"/>
-              <a:t>other</a:t>
-            </a:r>
-            <a:r>
-              <a:rPr lang="fr-CH" dirty="0"/>
-              <a:t> ?</a:t>
-            </a:r>
-          </a:p>
-        </p:txBody>
-      </p:sp>
-      <p:sp>
-        <p:nvSpPr>
-          <p:cNvPr id="20" name="ZoneTexte 19">
-            <a:extLst>
-              <a:ext uri="{FF2B5EF4-FFF2-40B4-BE49-F238E27FC236}">
-                <a16:creationId xmlns:a16="http://schemas.microsoft.com/office/drawing/2014/main" id="{236502B9-600A-4E1E-98F3-D2AF7E1A8F44}"/>
-              </a:ext>
-            </a:extLst>
-          </p:cNvPr>
-          <p:cNvSpPr txBox="1"/>
-          <p:nvPr/>
-        </p:nvSpPr>
-        <p:spPr>
-          <a:xfrm>
-            <a:off x="4562764" y="2413516"/>
-            <a:ext cx="738833" cy="261610"/>
-          </a:xfrm>
-          <a:prstGeom prst="rect">
-            <a:avLst/>
-          </a:prstGeom>
-          <a:noFill/>
-        </p:spPr>
-        <p:txBody>
-          <a:bodyPr wrap="square" rtlCol="0">
-            <a:spAutoFit/>
-          </a:bodyPr>
-          <a:lstStyle/>
-          <a:p>
-            <a:r>
-              <a:rPr lang="fr-CH" sz="1100" dirty="0"/>
-              <a:t>~30 kDa</a:t>
-            </a:r>
-          </a:p>
-        </p:txBody>
-      </p:sp>
-      <p:sp>
-        <p:nvSpPr>
-          <p:cNvPr id="27" name="ZoneTexte 26">
-            <a:extLst>
-              <a:ext uri="{FF2B5EF4-FFF2-40B4-BE49-F238E27FC236}">
-                <a16:creationId xmlns:a16="http://schemas.microsoft.com/office/drawing/2014/main" id="{3535C362-498C-4389-8285-D8E21C7DE29E}"/>
-              </a:ext>
-            </a:extLst>
-          </p:cNvPr>
-          <p:cNvSpPr txBox="1"/>
-          <p:nvPr/>
-        </p:nvSpPr>
-        <p:spPr>
-          <a:xfrm>
-            <a:off x="4619120" y="2609901"/>
-            <a:ext cx="738833" cy="261610"/>
-          </a:xfrm>
-          <a:prstGeom prst="rect">
-            <a:avLst/>
-          </a:prstGeom>
-          <a:noFill/>
-        </p:spPr>
-        <p:txBody>
-          <a:bodyPr wrap="square" rtlCol="0">
-            <a:spAutoFit/>
-          </a:bodyPr>
-          <a:lstStyle/>
-          <a:p>
-            <a:r>
-              <a:rPr lang="fr-CH" sz="1100" dirty="0"/>
-              <a:t>810 </a:t>
-            </a:r>
-            <a:r>
-              <a:rPr lang="fr-CH" sz="1100" dirty="0" err="1"/>
-              <a:t>bp</a:t>
-            </a:r>
-            <a:endParaRPr lang="fr-CH" sz="1100" dirty="0"/>
-          </a:p>
-        </p:txBody>
-      </p:sp>
-      <p:sp>
-        <p:nvSpPr>
-          <p:cNvPr id="25" name="ZoneTexte 24">
-            <a:extLst>
-              <a:ext uri="{FF2B5EF4-FFF2-40B4-BE49-F238E27FC236}">
-                <a16:creationId xmlns:a16="http://schemas.microsoft.com/office/drawing/2014/main" id="{2CE85DCB-0259-4C60-95EE-4D3974A84A42}"/>
-              </a:ext>
-            </a:extLst>
-          </p:cNvPr>
-          <p:cNvSpPr txBox="1"/>
-          <p:nvPr/>
-        </p:nvSpPr>
-        <p:spPr>
-          <a:xfrm>
-            <a:off x="5429250" y="3758441"/>
-            <a:ext cx="6108155" cy="2031325"/>
-          </a:xfrm>
-          <a:prstGeom prst="rect">
-            <a:avLst/>
-          </a:prstGeom>
-          <a:noFill/>
-        </p:spPr>
-        <p:txBody>
-          <a:bodyPr wrap="square" rtlCol="0">
-            <a:spAutoFit/>
-          </a:bodyPr>
-          <a:lstStyle/>
-          <a:p>
-            <a:r>
-              <a:rPr lang="fr-CH" dirty="0"/>
-              <a:t>One </a:t>
-            </a:r>
-            <a:r>
-              <a:rPr lang="fr-CH" dirty="0" err="1"/>
-              <a:t>gene</a:t>
-            </a:r>
-            <a:r>
-              <a:rPr lang="fr-CH" dirty="0"/>
-              <a:t> </a:t>
-            </a:r>
-            <a:r>
-              <a:rPr lang="fr-CH" dirty="0" err="1"/>
-              <a:t>matching</a:t>
-            </a:r>
-            <a:r>
-              <a:rPr lang="fr-CH" dirty="0"/>
-              <a:t> group and size: </a:t>
-            </a:r>
-          </a:p>
-          <a:p>
-            <a:endParaRPr lang="fr-CH" dirty="0"/>
-          </a:p>
-          <a:p>
-            <a:r>
-              <a:rPr lang="fr-CH" dirty="0"/>
-              <a:t>Lhv_2053, </a:t>
-            </a:r>
-            <a:r>
-              <a:rPr lang="fr-CH" dirty="0" err="1"/>
-              <a:t>Lysin</a:t>
-            </a:r>
-            <a:r>
-              <a:rPr lang="fr-CH" dirty="0"/>
-              <a:t>, </a:t>
-            </a:r>
-            <a:r>
-              <a:rPr lang="fr-CH" dirty="0" err="1"/>
-              <a:t>pseudogene</a:t>
-            </a:r>
-            <a:r>
-              <a:rPr lang="fr-CH" dirty="0"/>
-              <a:t> in </a:t>
-            </a:r>
-            <a:r>
-              <a:rPr lang="fr-CH" i="1" dirty="0"/>
-              <a:t>L. </a:t>
-            </a:r>
-            <a:r>
-              <a:rPr lang="fr-CH" i="1" dirty="0" err="1"/>
-              <a:t>helveticus</a:t>
-            </a:r>
-            <a:r>
-              <a:rPr lang="fr-CH" dirty="0"/>
-              <a:t>. </a:t>
-            </a:r>
-          </a:p>
-          <a:p>
-            <a:r>
-              <a:rPr lang="fr-CH" dirty="0"/>
-              <a:t>893 </a:t>
-            </a:r>
-            <a:r>
-              <a:rPr lang="fr-CH" dirty="0" err="1"/>
-              <a:t>bp</a:t>
-            </a:r>
-            <a:r>
-              <a:rPr lang="fr-CH" dirty="0"/>
-              <a:t> / 33 kDa</a:t>
-            </a:r>
-          </a:p>
-          <a:p>
-            <a:endParaRPr lang="fr-CH" dirty="0"/>
-          </a:p>
-          <a:p>
-            <a:endParaRPr lang="fr-CH" dirty="0"/>
-          </a:p>
-          <a:p>
-            <a:r>
-              <a:rPr lang="fr-CH" dirty="0"/>
-              <a:t>Provenance: </a:t>
-            </a:r>
-            <a:r>
-              <a:rPr lang="fr-CH" dirty="0" err="1"/>
-              <a:t>Bacteriophage</a:t>
-            </a:r>
-            <a:r>
-              <a:rPr lang="fr-CH" dirty="0"/>
-              <a:t> Cp-1 </a:t>
-            </a:r>
-          </a:p>
-        </p:txBody>
-      </p:sp>
       <p:pic>
         <p:nvPicPr>
-          <p:cNvPr id="28" name="Image 27">
-            <a:extLst>
-              <a:ext uri="{FF2B5EF4-FFF2-40B4-BE49-F238E27FC236}">
-                <a16:creationId xmlns:a16="http://schemas.microsoft.com/office/drawing/2014/main" id="{AF57A512-657A-4CC6-B651-59E47FE9D90C}"/>
+          <p:cNvPr id="18" name="Image 17">
+            <a:extLst>
+              <a:ext uri="{FF2B5EF4-FFF2-40B4-BE49-F238E27FC236}">
+                <a16:creationId xmlns:a16="http://schemas.microsoft.com/office/drawing/2014/main" id="{6A174524-EF97-47A8-A030-014B2C91C1C2}"/>
               </a:ext>
             </a:extLst>
           </p:cNvPr>
@@ -7640,8 +7907,8 @@
         </p:blipFill>
         <p:spPr>
           <a:xfrm>
-            <a:off x="8965325" y="4865350"/>
-            <a:ext cx="933333" cy="1523810"/>
+            <a:off x="1878846" y="5285000"/>
+            <a:ext cx="976230" cy="976230"/>
           </a:xfrm>
           <a:prstGeom prst="rect">
             <a:avLst/>
@@ -7650,10 +7917,10 @@
       </p:pic>
       <p:sp>
         <p:nvSpPr>
-          <p:cNvPr id="29" name="ZoneTexte 28">
-            <a:extLst>
-              <a:ext uri="{FF2B5EF4-FFF2-40B4-BE49-F238E27FC236}">
-                <a16:creationId xmlns:a16="http://schemas.microsoft.com/office/drawing/2014/main" id="{22544A37-9D30-4155-ADA3-AAA1475CF92C}"/>
+          <p:cNvPr id="20" name="ZoneTexte 19">
+            <a:extLst>
+              <a:ext uri="{FF2B5EF4-FFF2-40B4-BE49-F238E27FC236}">
+                <a16:creationId xmlns:a16="http://schemas.microsoft.com/office/drawing/2014/main" id="{236502B9-600A-4E1E-98F3-D2AF7E1A8F44}"/>
               </a:ext>
             </a:extLst>
           </p:cNvPr>
@@ -7662,8 +7929,8 @@
         </p:nvSpPr>
         <p:spPr>
           <a:xfrm>
-            <a:off x="2356211" y="4186463"/>
-            <a:ext cx="2780145" cy="923330"/>
+            <a:off x="4562764" y="2413516"/>
+            <a:ext cx="738833" cy="261610"/>
           </a:xfrm>
           <a:prstGeom prst="rect">
             <a:avLst/>
@@ -7677,21 +7944,863 @@
           <a:lstStyle/>
           <a:p>
             <a:r>
-              <a:rPr lang="fr-CH" dirty="0"/>
-              <a:t>Assemble</a:t>
-            </a:r>
-          </a:p>
-          <a:p>
-            <a:r>
-              <a:rPr lang="fr-CH" dirty="0" err="1"/>
-              <a:t>Annotate</a:t>
-            </a:r>
-            <a:endParaRPr lang="fr-CH" dirty="0"/>
-          </a:p>
-          <a:p>
-            <a:r>
-              <a:rPr lang="fr-CH" dirty="0"/>
-              <a:t>Compare</a:t>
+              <a:rPr lang="fr-CH" sz="1100" dirty="0"/>
+              <a:t>~30 kDa</a:t>
+            </a:r>
+          </a:p>
+        </p:txBody>
+      </p:sp>
+      <p:sp>
+        <p:nvSpPr>
+          <p:cNvPr id="27" name="ZoneTexte 26">
+            <a:extLst>
+              <a:ext uri="{FF2B5EF4-FFF2-40B4-BE49-F238E27FC236}">
+                <a16:creationId xmlns:a16="http://schemas.microsoft.com/office/drawing/2014/main" id="{3535C362-498C-4389-8285-D8E21C7DE29E}"/>
+              </a:ext>
+            </a:extLst>
+          </p:cNvPr>
+          <p:cNvSpPr txBox="1"/>
+          <p:nvPr/>
+        </p:nvSpPr>
+        <p:spPr>
+          <a:xfrm>
+            <a:off x="4619120" y="2609901"/>
+            <a:ext cx="738833" cy="261610"/>
+          </a:xfrm>
+          <a:prstGeom prst="rect">
+            <a:avLst/>
+          </a:prstGeom>
+          <a:noFill/>
+        </p:spPr>
+        <p:txBody>
+          <a:bodyPr wrap="square" rtlCol="0">
+            <a:spAutoFit/>
+          </a:bodyPr>
+          <a:lstStyle/>
+          <a:p>
+            <a:r>
+              <a:rPr lang="fr-CH" sz="1100" dirty="0"/>
+              <a:t>810 </a:t>
+            </a:r>
+            <a:r>
+              <a:rPr lang="fr-CH" sz="1100" dirty="0" err="1"/>
+              <a:t>bp</a:t>
+            </a:r>
+            <a:endParaRPr lang="fr-CH" sz="1100" dirty="0"/>
+          </a:p>
+        </p:txBody>
+      </p:sp>
+      <p:sp>
+        <p:nvSpPr>
+          <p:cNvPr id="25" name="ZoneTexte 24">
+            <a:extLst>
+              <a:ext uri="{FF2B5EF4-FFF2-40B4-BE49-F238E27FC236}">
+                <a16:creationId xmlns:a16="http://schemas.microsoft.com/office/drawing/2014/main" id="{2CE85DCB-0259-4C60-95EE-4D3974A84A42}"/>
+              </a:ext>
+            </a:extLst>
+          </p:cNvPr>
+          <p:cNvSpPr txBox="1"/>
+          <p:nvPr/>
+        </p:nvSpPr>
+        <p:spPr>
+          <a:xfrm>
+            <a:off x="6572250" y="4294279"/>
+            <a:ext cx="6108155" cy="2031325"/>
+          </a:xfrm>
+          <a:prstGeom prst="rect">
+            <a:avLst/>
+          </a:prstGeom>
+          <a:noFill/>
+        </p:spPr>
+        <p:txBody>
+          <a:bodyPr wrap="square" rtlCol="0">
+            <a:spAutoFit/>
+          </a:bodyPr>
+          <a:lstStyle/>
+          <a:p>
+            <a:r>
+              <a:rPr lang="en-GB" dirty="0"/>
+              <a:t>One gene matching group and size: </a:t>
+            </a:r>
+          </a:p>
+          <a:p>
+            <a:endParaRPr lang="en-GB" dirty="0"/>
+          </a:p>
+          <a:p>
+            <a:r>
+              <a:rPr lang="fr-CH" dirty="0">
+                <a:solidFill>
+                  <a:srgbClr val="003300"/>
+                </a:solidFill>
+              </a:rPr>
+              <a:t>• </a:t>
+            </a:r>
+            <a:r>
+              <a:rPr lang="en-GB" dirty="0"/>
+              <a:t>Lhv_2053, Lysin, pseudogene in </a:t>
+            </a:r>
+            <a:r>
+              <a:rPr lang="en-GB" i="1" dirty="0"/>
+              <a:t>L. </a:t>
+            </a:r>
+            <a:r>
+              <a:rPr lang="en-GB" i="1" dirty="0" err="1"/>
+              <a:t>helveticus</a:t>
+            </a:r>
+            <a:r>
+              <a:rPr lang="en-GB" dirty="0"/>
+              <a:t>. </a:t>
+            </a:r>
+          </a:p>
+          <a:p>
+            <a:r>
+              <a:rPr lang="fr-CH" dirty="0">
+                <a:solidFill>
+                  <a:srgbClr val="003300"/>
+                </a:solidFill>
+              </a:rPr>
+              <a:t>• </a:t>
+            </a:r>
+            <a:r>
+              <a:rPr lang="en-GB" dirty="0"/>
+              <a:t>893 bp / 33 </a:t>
+            </a:r>
+            <a:r>
+              <a:rPr lang="en-GB" dirty="0" err="1"/>
+              <a:t>kDa</a:t>
+            </a:r>
+            <a:endParaRPr lang="en-GB" dirty="0"/>
+          </a:p>
+          <a:p>
+            <a:endParaRPr lang="en-GB" dirty="0"/>
+          </a:p>
+          <a:p>
+            <a:endParaRPr lang="en-GB" dirty="0"/>
+          </a:p>
+          <a:p>
+            <a:r>
+              <a:rPr lang="en-GB" dirty="0"/>
+              <a:t>Provenance: Bacteriophage Cp-1 </a:t>
+            </a:r>
+          </a:p>
+        </p:txBody>
+      </p:sp>
+      <p:pic>
+        <p:nvPicPr>
+          <p:cNvPr id="28" name="Image 27">
+            <a:extLst>
+              <a:ext uri="{FF2B5EF4-FFF2-40B4-BE49-F238E27FC236}">
+                <a16:creationId xmlns:a16="http://schemas.microsoft.com/office/drawing/2014/main" id="{AF57A512-657A-4CC6-B651-59E47FE9D90C}"/>
+              </a:ext>
+            </a:extLst>
+          </p:cNvPr>
+          <p:cNvPicPr>
+            <a:picLocks noChangeAspect="1"/>
+          </p:cNvPicPr>
+          <p:nvPr/>
+        </p:nvPicPr>
+        <p:blipFill>
+          <a:blip r:embed="rId6"/>
+          <a:stretch>
+            <a:fillRect/>
+          </a:stretch>
+        </p:blipFill>
+        <p:spPr>
+          <a:xfrm>
+            <a:off x="5712164" y="3045576"/>
+            <a:ext cx="1011821" cy="1651954"/>
+          </a:xfrm>
+          <a:prstGeom prst="rect">
+            <a:avLst/>
+          </a:prstGeom>
+        </p:spPr>
+      </p:pic>
+      <p:sp>
+        <p:nvSpPr>
+          <p:cNvPr id="24" name="Flèche : droite rayée 23">
+            <a:extLst>
+              <a:ext uri="{FF2B5EF4-FFF2-40B4-BE49-F238E27FC236}">
+                <a16:creationId xmlns:a16="http://schemas.microsoft.com/office/drawing/2014/main" id="{A32CA056-1FC8-4C0D-99B0-57915B9D72AF}"/>
+              </a:ext>
+            </a:extLst>
+          </p:cNvPr>
+          <p:cNvSpPr/>
+          <p:nvPr/>
+        </p:nvSpPr>
+        <p:spPr>
+          <a:xfrm>
+            <a:off x="2908300" y="5027490"/>
+            <a:ext cx="3008651" cy="216058"/>
+          </a:xfrm>
+          <a:prstGeom prst="stripedRightArrow">
+            <a:avLst/>
+          </a:prstGeom>
+        </p:spPr>
+        <p:style>
+          <a:lnRef idx="2">
+            <a:schemeClr val="accent1">
+              <a:shade val="50000"/>
+            </a:schemeClr>
+          </a:lnRef>
+          <a:fillRef idx="1">
+            <a:schemeClr val="accent1"/>
+          </a:fillRef>
+          <a:effectRef idx="0">
+            <a:schemeClr val="accent1"/>
+          </a:effectRef>
+          <a:fontRef idx="minor">
+            <a:schemeClr val="lt1"/>
+          </a:fontRef>
+        </p:style>
+        <p:txBody>
+          <a:bodyPr rtlCol="0" anchor="ctr"/>
+          <a:lstStyle/>
+          <a:p>
+            <a:pPr algn="ctr"/>
+            <a:endParaRPr lang="en-GB"/>
+          </a:p>
+        </p:txBody>
+      </p:sp>
+      <p:grpSp>
+        <p:nvGrpSpPr>
+          <p:cNvPr id="26" name="Groupe 25">
+            <a:extLst>
+              <a:ext uri="{FF2B5EF4-FFF2-40B4-BE49-F238E27FC236}">
+                <a16:creationId xmlns:a16="http://schemas.microsoft.com/office/drawing/2014/main" id="{11A959D3-2674-49F0-B2F2-0B3FAEFC124C}"/>
+              </a:ext>
+            </a:extLst>
+          </p:cNvPr>
+          <p:cNvGrpSpPr/>
+          <p:nvPr/>
+        </p:nvGrpSpPr>
+        <p:grpSpPr>
+          <a:xfrm>
+            <a:off x="3356133" y="4433998"/>
+            <a:ext cx="2124573" cy="1403042"/>
+            <a:chOff x="4335494" y="2847225"/>
+            <a:chExt cx="3521011" cy="2360591"/>
+          </a:xfrm>
+        </p:grpSpPr>
+        <p:grpSp>
+          <p:nvGrpSpPr>
+            <p:cNvPr id="30" name="Groupe 29">
+              <a:extLst>
+                <a:ext uri="{FF2B5EF4-FFF2-40B4-BE49-F238E27FC236}">
+                  <a16:creationId xmlns:a16="http://schemas.microsoft.com/office/drawing/2014/main" id="{AA8EE1AA-F487-4F73-B2D4-58622E6C9D5D}"/>
+                </a:ext>
+              </a:extLst>
+            </p:cNvPr>
+            <p:cNvGrpSpPr/>
+            <p:nvPr/>
+          </p:nvGrpSpPr>
+          <p:grpSpPr>
+            <a:xfrm>
+              <a:off x="5421372" y="2847225"/>
+              <a:ext cx="1349255" cy="1163549"/>
+              <a:chOff x="2917790" y="320534"/>
+              <a:chExt cx="1349255" cy="1163549"/>
+            </a:xfrm>
+          </p:grpSpPr>
+          <p:sp>
+            <p:nvSpPr>
+              <p:cNvPr id="40" name="Hexagone 39">
+                <a:extLst>
+                  <a:ext uri="{FF2B5EF4-FFF2-40B4-BE49-F238E27FC236}">
+                    <a16:creationId xmlns:a16="http://schemas.microsoft.com/office/drawing/2014/main" id="{8A969A83-0FC2-4A45-997B-07038DFF1B52}"/>
+                  </a:ext>
+                </a:extLst>
+              </p:cNvPr>
+              <p:cNvSpPr/>
+              <p:nvPr/>
+            </p:nvSpPr>
+            <p:spPr>
+              <a:xfrm>
+                <a:off x="2917790" y="320534"/>
+                <a:ext cx="1349255" cy="1163549"/>
+              </a:xfrm>
+              <a:prstGeom prst="hexagon">
+                <a:avLst>
+                  <a:gd name="adj" fmla="val 25000"/>
+                  <a:gd name="vf" fmla="val 115470"/>
+                </a:avLst>
+              </a:prstGeom>
+            </p:spPr>
+            <p:style>
+              <a:lnRef idx="2">
+                <a:schemeClr val="accent5"/>
+              </a:lnRef>
+              <a:fillRef idx="1">
+                <a:schemeClr val="lt1"/>
+              </a:fillRef>
+              <a:effectRef idx="0">
+                <a:schemeClr val="accent5"/>
+              </a:effectRef>
+              <a:fontRef idx="minor">
+                <a:schemeClr val="dk1"/>
+              </a:fontRef>
+            </p:style>
+          </p:sp>
+          <p:sp>
+            <p:nvSpPr>
+              <p:cNvPr id="41" name="Hexagone 4">
+                <a:extLst>
+                  <a:ext uri="{FF2B5EF4-FFF2-40B4-BE49-F238E27FC236}">
+                    <a16:creationId xmlns:a16="http://schemas.microsoft.com/office/drawing/2014/main" id="{2324953F-7CD1-4EAF-A373-287FB9024ECC}"/>
+                  </a:ext>
+                </a:extLst>
+              </p:cNvPr>
+              <p:cNvSpPr txBox="1"/>
+              <p:nvPr/>
+            </p:nvSpPr>
+            <p:spPr>
+              <a:xfrm>
+                <a:off x="3127190" y="501113"/>
+                <a:ext cx="930455" cy="802391"/>
+              </a:xfrm>
+              <a:prstGeom prst="rect">
+                <a:avLst/>
+              </a:prstGeom>
+            </p:spPr>
+            <p:style>
+              <a:lnRef idx="0">
+                <a:scrgbClr r="0" g="0" b="0"/>
+              </a:lnRef>
+              <a:fillRef idx="0">
+                <a:scrgbClr r="0" g="0" b="0"/>
+              </a:fillRef>
+              <a:effectRef idx="0">
+                <a:scrgbClr r="0" g="0" b="0"/>
+              </a:effectRef>
+              <a:fontRef idx="minor">
+                <a:schemeClr val="lt1"/>
+              </a:fontRef>
+            </p:style>
+            <p:txBody>
+              <a:bodyPr spcFirstLastPara="0" vert="horz" wrap="square" lIns="0" tIns="22860" rIns="0" bIns="22860" numCol="1" spcCol="1270" anchor="ctr" anchorCtr="0">
+                <a:noAutofit/>
+              </a:bodyPr>
+              <a:lstStyle/>
+              <a:p>
+                <a:pPr marL="0" lvl="0" indent="0" algn="ctr" defTabSz="800100">
+                  <a:lnSpc>
+                    <a:spcPct val="90000"/>
+                  </a:lnSpc>
+                  <a:spcBef>
+                    <a:spcPct val="0"/>
+                  </a:spcBef>
+                  <a:spcAft>
+                    <a:spcPct val="35000"/>
+                  </a:spcAft>
+                  <a:buNone/>
+                </a:pPr>
+                <a:r>
+                  <a:rPr lang="en-GB" sz="1100" kern="1200" dirty="0">
+                    <a:solidFill>
+                      <a:schemeClr val="tx1"/>
+                    </a:solidFill>
+                  </a:rPr>
+                  <a:t>Assemble</a:t>
+                </a:r>
+              </a:p>
+            </p:txBody>
+          </p:sp>
+        </p:grpSp>
+        <p:grpSp>
+          <p:nvGrpSpPr>
+            <p:cNvPr id="31" name="Groupe 30">
+              <a:extLst>
+                <a:ext uri="{FF2B5EF4-FFF2-40B4-BE49-F238E27FC236}">
+                  <a16:creationId xmlns:a16="http://schemas.microsoft.com/office/drawing/2014/main" id="{C422B0AC-6260-42B9-9107-B5C23F8EED4B}"/>
+                </a:ext>
+              </a:extLst>
+            </p:cNvPr>
+            <p:cNvGrpSpPr/>
+            <p:nvPr/>
+          </p:nvGrpSpPr>
+          <p:grpSpPr>
+            <a:xfrm>
+              <a:off x="5421372" y="4044267"/>
+              <a:ext cx="1349255" cy="1163549"/>
+              <a:chOff x="2917790" y="320534"/>
+              <a:chExt cx="1349255" cy="1163549"/>
+            </a:xfrm>
+          </p:grpSpPr>
+          <p:sp>
+            <p:nvSpPr>
+              <p:cNvPr id="38" name="Hexagone 37">
+                <a:extLst>
+                  <a:ext uri="{FF2B5EF4-FFF2-40B4-BE49-F238E27FC236}">
+                    <a16:creationId xmlns:a16="http://schemas.microsoft.com/office/drawing/2014/main" id="{22CE0BA1-AEA9-4587-8927-5CFFADF3B069}"/>
+                  </a:ext>
+                </a:extLst>
+              </p:cNvPr>
+              <p:cNvSpPr/>
+              <p:nvPr/>
+            </p:nvSpPr>
+            <p:spPr>
+              <a:xfrm>
+                <a:off x="2917790" y="320534"/>
+                <a:ext cx="1349255" cy="1163549"/>
+              </a:xfrm>
+              <a:prstGeom prst="hexagon">
+                <a:avLst>
+                  <a:gd name="adj" fmla="val 25000"/>
+                  <a:gd name="vf" fmla="val 115470"/>
+                </a:avLst>
+              </a:prstGeom>
+              <a:ln/>
+            </p:spPr>
+            <p:style>
+              <a:lnRef idx="2">
+                <a:schemeClr val="accent6"/>
+              </a:lnRef>
+              <a:fillRef idx="1">
+                <a:schemeClr val="lt1"/>
+              </a:fillRef>
+              <a:effectRef idx="0">
+                <a:schemeClr val="accent6"/>
+              </a:effectRef>
+              <a:fontRef idx="minor">
+                <a:schemeClr val="dk1"/>
+              </a:fontRef>
+            </p:style>
+          </p:sp>
+          <p:sp>
+            <p:nvSpPr>
+              <p:cNvPr id="39" name="Hexagone 4">
+                <a:extLst>
+                  <a:ext uri="{FF2B5EF4-FFF2-40B4-BE49-F238E27FC236}">
+                    <a16:creationId xmlns:a16="http://schemas.microsoft.com/office/drawing/2014/main" id="{F4D4971C-3742-498A-8CD8-9E22AD16FA05}"/>
+                  </a:ext>
+                </a:extLst>
+              </p:cNvPr>
+              <p:cNvSpPr txBox="1"/>
+              <p:nvPr/>
+            </p:nvSpPr>
+            <p:spPr>
+              <a:xfrm>
+                <a:off x="3127190" y="501113"/>
+                <a:ext cx="930455" cy="802391"/>
+              </a:xfrm>
+              <a:prstGeom prst="rect">
+                <a:avLst/>
+              </a:prstGeom>
+              <a:ln>
+                <a:noFill/>
+              </a:ln>
+            </p:spPr>
+            <p:style>
+              <a:lnRef idx="2">
+                <a:schemeClr val="accent6"/>
+              </a:lnRef>
+              <a:fillRef idx="1">
+                <a:schemeClr val="lt1"/>
+              </a:fillRef>
+              <a:effectRef idx="0">
+                <a:schemeClr val="accent6"/>
+              </a:effectRef>
+              <a:fontRef idx="minor">
+                <a:schemeClr val="dk1"/>
+              </a:fontRef>
+            </p:style>
+            <p:txBody>
+              <a:bodyPr spcFirstLastPara="0" vert="horz" wrap="square" lIns="0" tIns="22860" rIns="0" bIns="22860" numCol="1" spcCol="1270" anchor="ctr" anchorCtr="0">
+                <a:noAutofit/>
+              </a:bodyPr>
+              <a:lstStyle/>
+              <a:p>
+                <a:pPr marL="0" lvl="0" indent="0" algn="ctr" defTabSz="800100">
+                  <a:lnSpc>
+                    <a:spcPct val="90000"/>
+                  </a:lnSpc>
+                  <a:spcBef>
+                    <a:spcPct val="0"/>
+                  </a:spcBef>
+                  <a:spcAft>
+                    <a:spcPct val="35000"/>
+                  </a:spcAft>
+                  <a:buNone/>
+                </a:pPr>
+                <a:r>
+                  <a:rPr lang="en-GB" sz="1100" kern="1200" dirty="0"/>
+                  <a:t>Annotate</a:t>
+                </a:r>
+              </a:p>
+            </p:txBody>
+          </p:sp>
+        </p:grpSp>
+        <p:grpSp>
+          <p:nvGrpSpPr>
+            <p:cNvPr id="32" name="Groupe 31">
+              <a:extLst>
+                <a:ext uri="{FF2B5EF4-FFF2-40B4-BE49-F238E27FC236}">
+                  <a16:creationId xmlns:a16="http://schemas.microsoft.com/office/drawing/2014/main" id="{A5568495-AC49-42EA-8A28-73AC7288A27E}"/>
+                </a:ext>
+              </a:extLst>
+            </p:cNvPr>
+            <p:cNvGrpSpPr/>
+            <p:nvPr/>
+          </p:nvGrpSpPr>
+          <p:grpSpPr>
+            <a:xfrm>
+              <a:off x="4335494" y="3445746"/>
+              <a:ext cx="1349255" cy="1163549"/>
+              <a:chOff x="2917790" y="320534"/>
+              <a:chExt cx="1349255" cy="1163549"/>
+            </a:xfrm>
+            <a:solidFill>
+              <a:schemeClr val="accent3">
+                <a:lumMod val="40000"/>
+                <a:lumOff val="60000"/>
+              </a:schemeClr>
+            </a:solidFill>
+          </p:grpSpPr>
+          <p:sp>
+            <p:nvSpPr>
+              <p:cNvPr id="36" name="Hexagone 35">
+                <a:extLst>
+                  <a:ext uri="{FF2B5EF4-FFF2-40B4-BE49-F238E27FC236}">
+                    <a16:creationId xmlns:a16="http://schemas.microsoft.com/office/drawing/2014/main" id="{450B70A2-6C31-40F7-B4B9-A783AA46376C}"/>
+                  </a:ext>
+                </a:extLst>
+              </p:cNvPr>
+              <p:cNvSpPr/>
+              <p:nvPr/>
+            </p:nvSpPr>
+            <p:spPr>
+              <a:xfrm>
+                <a:off x="2917790" y="320534"/>
+                <a:ext cx="1349255" cy="1163549"/>
+              </a:xfrm>
+              <a:prstGeom prst="hexagon">
+                <a:avLst>
+                  <a:gd name="adj" fmla="val 25000"/>
+                  <a:gd name="vf" fmla="val 115470"/>
+                </a:avLst>
+              </a:prstGeom>
+              <a:solidFill>
+                <a:schemeClr val="accent3">
+                  <a:lumMod val="50000"/>
+                </a:schemeClr>
+              </a:solidFill>
+              <a:ln>
+                <a:solidFill>
+                  <a:schemeClr val="accent3">
+                    <a:lumMod val="75000"/>
+                  </a:schemeClr>
+                </a:solidFill>
+              </a:ln>
+            </p:spPr>
+            <p:style>
+              <a:lnRef idx="2">
+                <a:schemeClr val="accent1">
+                  <a:hueOff val="0"/>
+                  <a:satOff val="0"/>
+                  <a:lumOff val="0"/>
+                  <a:alphaOff val="0"/>
+                </a:schemeClr>
+              </a:lnRef>
+              <a:fillRef idx="1">
+                <a:schemeClr val="accent1">
+                  <a:hueOff val="0"/>
+                  <a:satOff val="0"/>
+                  <a:lumOff val="0"/>
+                  <a:alphaOff val="0"/>
+                </a:schemeClr>
+              </a:fillRef>
+              <a:effectRef idx="0">
+                <a:schemeClr val="accent1">
+                  <a:hueOff val="0"/>
+                  <a:satOff val="0"/>
+                  <a:lumOff val="0"/>
+                  <a:alphaOff val="0"/>
+                </a:schemeClr>
+              </a:effectRef>
+              <a:fontRef idx="minor">
+                <a:schemeClr val="lt1"/>
+              </a:fontRef>
+            </p:style>
+          </p:sp>
+          <p:sp>
+            <p:nvSpPr>
+              <p:cNvPr id="37" name="Hexagone 4">
+                <a:extLst>
+                  <a:ext uri="{FF2B5EF4-FFF2-40B4-BE49-F238E27FC236}">
+                    <a16:creationId xmlns:a16="http://schemas.microsoft.com/office/drawing/2014/main" id="{1638ED84-8794-48E7-B76D-67E207352F95}"/>
+                  </a:ext>
+                </a:extLst>
+              </p:cNvPr>
+              <p:cNvSpPr txBox="1"/>
+              <p:nvPr/>
+            </p:nvSpPr>
+            <p:spPr>
+              <a:xfrm>
+                <a:off x="3127190" y="501113"/>
+                <a:ext cx="930455" cy="802391"/>
+              </a:xfrm>
+              <a:prstGeom prst="rect">
+                <a:avLst/>
+              </a:prstGeom>
+              <a:solidFill>
+                <a:schemeClr val="accent3">
+                  <a:lumMod val="50000"/>
+                </a:schemeClr>
+              </a:solidFill>
+              <a:ln>
+                <a:noFill/>
+              </a:ln>
+            </p:spPr>
+            <p:style>
+              <a:lnRef idx="0">
+                <a:scrgbClr r="0" g="0" b="0"/>
+              </a:lnRef>
+              <a:fillRef idx="0">
+                <a:scrgbClr r="0" g="0" b="0"/>
+              </a:fillRef>
+              <a:effectRef idx="0">
+                <a:scrgbClr r="0" g="0" b="0"/>
+              </a:effectRef>
+              <a:fontRef idx="minor">
+                <a:schemeClr val="lt1"/>
+              </a:fontRef>
+            </p:style>
+            <p:txBody>
+              <a:bodyPr spcFirstLastPara="0" vert="horz" wrap="square" lIns="0" tIns="22860" rIns="0" bIns="22860" numCol="1" spcCol="1270" anchor="ctr" anchorCtr="0">
+                <a:noAutofit/>
+              </a:bodyPr>
+              <a:lstStyle/>
+              <a:p>
+                <a:pPr marL="0" lvl="0" indent="0" algn="ctr" defTabSz="800100">
+                  <a:lnSpc>
+                    <a:spcPct val="90000"/>
+                  </a:lnSpc>
+                  <a:spcBef>
+                    <a:spcPct val="0"/>
+                  </a:spcBef>
+                  <a:spcAft>
+                    <a:spcPct val="35000"/>
+                  </a:spcAft>
+                  <a:buNone/>
+                </a:pPr>
+                <a:r>
+                  <a:rPr lang="en-GB" sz="1100" dirty="0"/>
+                  <a:t>Sequence</a:t>
+                </a:r>
+                <a:endParaRPr lang="en-GB" sz="1100" kern="1200" dirty="0"/>
+              </a:p>
+            </p:txBody>
+          </p:sp>
+        </p:grpSp>
+        <p:grpSp>
+          <p:nvGrpSpPr>
+            <p:cNvPr id="33" name="Groupe 32">
+              <a:extLst>
+                <a:ext uri="{FF2B5EF4-FFF2-40B4-BE49-F238E27FC236}">
+                  <a16:creationId xmlns:a16="http://schemas.microsoft.com/office/drawing/2014/main" id="{116524E3-591A-40E4-8E48-83DAD00679D7}"/>
+                </a:ext>
+              </a:extLst>
+            </p:cNvPr>
+            <p:cNvGrpSpPr/>
+            <p:nvPr/>
+          </p:nvGrpSpPr>
+          <p:grpSpPr>
+            <a:xfrm>
+              <a:off x="6507250" y="3445130"/>
+              <a:ext cx="1349255" cy="1163549"/>
+              <a:chOff x="2917790" y="320534"/>
+              <a:chExt cx="1349255" cy="1163549"/>
+            </a:xfrm>
+            <a:solidFill>
+              <a:schemeClr val="accent3">
+                <a:lumMod val="50000"/>
+              </a:schemeClr>
+            </a:solidFill>
+          </p:grpSpPr>
+          <p:sp>
+            <p:nvSpPr>
+              <p:cNvPr id="34" name="Hexagone 33">
+                <a:extLst>
+                  <a:ext uri="{FF2B5EF4-FFF2-40B4-BE49-F238E27FC236}">
+                    <a16:creationId xmlns:a16="http://schemas.microsoft.com/office/drawing/2014/main" id="{44391A65-9E00-4E56-89B4-A7D98AA2DAA2}"/>
+                  </a:ext>
+                </a:extLst>
+              </p:cNvPr>
+              <p:cNvSpPr/>
+              <p:nvPr/>
+            </p:nvSpPr>
+            <p:spPr>
+              <a:xfrm>
+                <a:off x="2917790" y="320534"/>
+                <a:ext cx="1349255" cy="1163549"/>
+              </a:xfrm>
+              <a:prstGeom prst="hexagon">
+                <a:avLst>
+                  <a:gd name="adj" fmla="val 25000"/>
+                  <a:gd name="vf" fmla="val 115470"/>
+                </a:avLst>
+              </a:prstGeom>
+              <a:grpFill/>
+            </p:spPr>
+            <p:style>
+              <a:lnRef idx="2">
+                <a:schemeClr val="accent1">
+                  <a:hueOff val="0"/>
+                  <a:satOff val="0"/>
+                  <a:lumOff val="0"/>
+                  <a:alphaOff val="0"/>
+                </a:schemeClr>
+              </a:lnRef>
+              <a:fillRef idx="1">
+                <a:schemeClr val="accent1">
+                  <a:hueOff val="0"/>
+                  <a:satOff val="0"/>
+                  <a:lumOff val="0"/>
+                  <a:alphaOff val="0"/>
+                </a:schemeClr>
+              </a:fillRef>
+              <a:effectRef idx="0">
+                <a:schemeClr val="accent1">
+                  <a:hueOff val="0"/>
+                  <a:satOff val="0"/>
+                  <a:lumOff val="0"/>
+                  <a:alphaOff val="0"/>
+                </a:schemeClr>
+              </a:effectRef>
+              <a:fontRef idx="minor">
+                <a:schemeClr val="lt1"/>
+              </a:fontRef>
+            </p:style>
+          </p:sp>
+          <p:sp>
+            <p:nvSpPr>
+              <p:cNvPr id="35" name="Hexagone 4">
+                <a:extLst>
+                  <a:ext uri="{FF2B5EF4-FFF2-40B4-BE49-F238E27FC236}">
+                    <a16:creationId xmlns:a16="http://schemas.microsoft.com/office/drawing/2014/main" id="{53716C27-8941-4230-BD75-29B7650BBFB2}"/>
+                  </a:ext>
+                </a:extLst>
+              </p:cNvPr>
+              <p:cNvSpPr txBox="1"/>
+              <p:nvPr/>
+            </p:nvSpPr>
+            <p:spPr>
+              <a:xfrm>
+                <a:off x="3127190" y="501113"/>
+                <a:ext cx="930455" cy="802391"/>
+              </a:xfrm>
+              <a:prstGeom prst="rect">
+                <a:avLst/>
+              </a:prstGeom>
+              <a:grpFill/>
+            </p:spPr>
+            <p:style>
+              <a:lnRef idx="0">
+                <a:scrgbClr r="0" g="0" b="0"/>
+              </a:lnRef>
+              <a:fillRef idx="0">
+                <a:scrgbClr r="0" g="0" b="0"/>
+              </a:fillRef>
+              <a:effectRef idx="0">
+                <a:scrgbClr r="0" g="0" b="0"/>
+              </a:effectRef>
+              <a:fontRef idx="minor">
+                <a:schemeClr val="lt1"/>
+              </a:fontRef>
+            </p:style>
+            <p:txBody>
+              <a:bodyPr spcFirstLastPara="0" vert="horz" wrap="square" lIns="0" tIns="22860" rIns="0" bIns="22860" numCol="1" spcCol="1270" anchor="ctr" anchorCtr="0">
+                <a:noAutofit/>
+              </a:bodyPr>
+              <a:lstStyle/>
+              <a:p>
+                <a:pPr marL="0" lvl="0" indent="0" algn="ctr" defTabSz="800100">
+                  <a:lnSpc>
+                    <a:spcPct val="90000"/>
+                  </a:lnSpc>
+                  <a:spcBef>
+                    <a:spcPct val="0"/>
+                  </a:spcBef>
+                  <a:spcAft>
+                    <a:spcPct val="35000"/>
+                  </a:spcAft>
+                  <a:buNone/>
+                </a:pPr>
+                <a:r>
+                  <a:rPr lang="en-GB" sz="1100" kern="1200" dirty="0"/>
+                  <a:t>Compare</a:t>
+                </a:r>
+              </a:p>
+            </p:txBody>
+          </p:sp>
+        </p:grpSp>
+      </p:grpSp>
+      <p:pic>
+        <p:nvPicPr>
+          <p:cNvPr id="42" name="Image 41">
+            <a:extLst>
+              <a:ext uri="{FF2B5EF4-FFF2-40B4-BE49-F238E27FC236}">
+                <a16:creationId xmlns:a16="http://schemas.microsoft.com/office/drawing/2014/main" id="{534BCBD6-FE7C-49D2-A7AD-6EE5BB9E24BE}"/>
+              </a:ext>
+            </a:extLst>
+          </p:cNvPr>
+          <p:cNvPicPr>
+            <a:picLocks noChangeAspect="1"/>
+          </p:cNvPicPr>
+          <p:nvPr/>
+        </p:nvPicPr>
+        <p:blipFill>
+          <a:blip r:embed="rId7">
+            <a:extLst>
+              <a:ext uri="{28A0092B-C50C-407E-A947-70E740481C1C}">
+                <a14:useLocalDpi xmlns:a14="http://schemas.microsoft.com/office/drawing/2010/main" val="0"/>
+              </a:ext>
+            </a:extLst>
+          </a:blip>
+          <a:stretch>
+            <a:fillRect/>
+          </a:stretch>
+        </p:blipFill>
+        <p:spPr>
+          <a:xfrm>
+            <a:off x="5299938" y="4180224"/>
+            <a:ext cx="1836274" cy="1709635"/>
+          </a:xfrm>
+          <a:prstGeom prst="rect">
+            <a:avLst/>
+          </a:prstGeom>
+        </p:spPr>
+      </p:pic>
+      <p:sp>
+        <p:nvSpPr>
+          <p:cNvPr id="43" name="ZoneTexte 42">
+            <a:extLst>
+              <a:ext uri="{FF2B5EF4-FFF2-40B4-BE49-F238E27FC236}">
+                <a16:creationId xmlns:a16="http://schemas.microsoft.com/office/drawing/2014/main" id="{2EB6F578-4ABA-4F41-89DD-C02DF67DA829}"/>
+              </a:ext>
+            </a:extLst>
+          </p:cNvPr>
+          <p:cNvSpPr txBox="1"/>
+          <p:nvPr/>
+        </p:nvSpPr>
+        <p:spPr>
+          <a:xfrm>
+            <a:off x="9668449" y="6517778"/>
+            <a:ext cx="2523551" cy="276999"/>
+          </a:xfrm>
+          <a:prstGeom prst="rect">
+            <a:avLst/>
+          </a:prstGeom>
+          <a:noFill/>
+        </p:spPr>
+        <p:txBody>
+          <a:bodyPr wrap="square" rtlCol="0">
+            <a:spAutoFit/>
+          </a:bodyPr>
+          <a:lstStyle/>
+          <a:p>
+            <a:r>
+              <a:rPr lang="en-GB" sz="1200" dirty="0"/>
+              <a:t>Thibault Schowing, BC.7107, HS2019</a:t>
             </a:r>
           </a:p>
         </p:txBody>

</xml_diff>

<commit_message>
pray for no conflicts
</commit_message>
<xml_diff>
--- a/Presentation/BC7107_Schowing.pptx
+++ b/Presentation/BC7107_Schowing.pptx
@@ -199,7 +199,7 @@
           <a:p>
             <a:fld id="{837851E2-4F80-458A-82DA-3FEE6873B106}" type="datetimeFigureOut">
               <a:rPr lang="fr-CH" smtClean="0"/>
-              <a:t>21.01.2020</a:t>
+              <a:t>26.01.2020</a:t>
             </a:fld>
             <a:endParaRPr lang="fr-CH"/>
           </a:p>
@@ -1213,7 +1213,7 @@
           <a:p>
             <a:fld id="{8AC31CE9-DC4A-423F-9343-8758E8045185}" type="datetimeFigureOut">
               <a:rPr lang="en-GB" smtClean="0"/>
-              <a:t>21/01/2020</a:t>
+              <a:t>26/01/2020</a:t>
             </a:fld>
             <a:endParaRPr lang="en-GB"/>
           </a:p>
@@ -1413,7 +1413,7 @@
           <a:p>
             <a:fld id="{8AC31CE9-DC4A-423F-9343-8758E8045185}" type="datetimeFigureOut">
               <a:rPr lang="en-GB" smtClean="0"/>
-              <a:t>21/01/2020</a:t>
+              <a:t>26/01/2020</a:t>
             </a:fld>
             <a:endParaRPr lang="en-GB"/>
           </a:p>
@@ -1623,7 +1623,7 @@
           <a:p>
             <a:fld id="{8AC31CE9-DC4A-423F-9343-8758E8045185}" type="datetimeFigureOut">
               <a:rPr lang="en-GB" smtClean="0"/>
-              <a:t>21/01/2020</a:t>
+              <a:t>26/01/2020</a:t>
             </a:fld>
             <a:endParaRPr lang="en-GB"/>
           </a:p>
@@ -1823,7 +1823,7 @@
           <a:p>
             <a:fld id="{8AC31CE9-DC4A-423F-9343-8758E8045185}" type="datetimeFigureOut">
               <a:rPr lang="en-GB" smtClean="0"/>
-              <a:t>21/01/2020</a:t>
+              <a:t>26/01/2020</a:t>
             </a:fld>
             <a:endParaRPr lang="en-GB"/>
           </a:p>
@@ -2099,7 +2099,7 @@
           <a:p>
             <a:fld id="{8AC31CE9-DC4A-423F-9343-8758E8045185}" type="datetimeFigureOut">
               <a:rPr lang="en-GB" smtClean="0"/>
-              <a:t>21/01/2020</a:t>
+              <a:t>26/01/2020</a:t>
             </a:fld>
             <a:endParaRPr lang="en-GB"/>
           </a:p>
@@ -2367,7 +2367,7 @@
           <a:p>
             <a:fld id="{8AC31CE9-DC4A-423F-9343-8758E8045185}" type="datetimeFigureOut">
               <a:rPr lang="en-GB" smtClean="0"/>
-              <a:t>21/01/2020</a:t>
+              <a:t>26/01/2020</a:t>
             </a:fld>
             <a:endParaRPr lang="en-GB"/>
           </a:p>
@@ -2782,7 +2782,7 @@
           <a:p>
             <a:fld id="{8AC31CE9-DC4A-423F-9343-8758E8045185}" type="datetimeFigureOut">
               <a:rPr lang="en-GB" smtClean="0"/>
-              <a:t>21/01/2020</a:t>
+              <a:t>26/01/2020</a:t>
             </a:fld>
             <a:endParaRPr lang="en-GB"/>
           </a:p>
@@ -2924,7 +2924,7 @@
           <a:p>
             <a:fld id="{8AC31CE9-DC4A-423F-9343-8758E8045185}" type="datetimeFigureOut">
               <a:rPr lang="en-GB" smtClean="0"/>
-              <a:t>21/01/2020</a:t>
+              <a:t>26/01/2020</a:t>
             </a:fld>
             <a:endParaRPr lang="en-GB"/>
           </a:p>
@@ -3037,7 +3037,7 @@
           <a:p>
             <a:fld id="{8AC31CE9-DC4A-423F-9343-8758E8045185}" type="datetimeFigureOut">
               <a:rPr lang="en-GB" smtClean="0"/>
-              <a:t>21/01/2020</a:t>
+              <a:t>26/01/2020</a:t>
             </a:fld>
             <a:endParaRPr lang="en-GB"/>
           </a:p>
@@ -3350,7 +3350,7 @@
           <a:p>
             <a:fld id="{8AC31CE9-DC4A-423F-9343-8758E8045185}" type="datetimeFigureOut">
               <a:rPr lang="en-GB" smtClean="0"/>
-              <a:t>21/01/2020</a:t>
+              <a:t>26/01/2020</a:t>
             </a:fld>
             <a:endParaRPr lang="en-GB"/>
           </a:p>
@@ -3639,7 +3639,7 @@
           <a:p>
             <a:fld id="{8AC31CE9-DC4A-423F-9343-8758E8045185}" type="datetimeFigureOut">
               <a:rPr lang="en-GB" smtClean="0"/>
-              <a:t>21/01/2020</a:t>
+              <a:t>26/01/2020</a:t>
             </a:fld>
             <a:endParaRPr lang="en-GB"/>
           </a:p>
@@ -3882,7 +3882,7 @@
           <a:p>
             <a:fld id="{8AC31CE9-DC4A-423F-9343-8758E8045185}" type="datetimeFigureOut">
               <a:rPr lang="en-GB" smtClean="0"/>
-              <a:t>21/01/2020</a:t>
+              <a:t>26/01/2020</a:t>
             </a:fld>
             <a:endParaRPr lang="en-GB"/>
           </a:p>

</xml_diff>

<commit_message>
final form of this asefag
</commit_message>
<xml_diff>
--- a/Presentation/BC7107_Schowing.pptx
+++ b/Presentation/BC7107_Schowing.pptx
@@ -199,7 +199,7 @@
           <a:p>
             <a:fld id="{837851E2-4F80-458A-82DA-3FEE6873B106}" type="datetimeFigureOut">
               <a:rPr lang="fr-CH" smtClean="0"/>
-              <a:t>26.01.2020</a:t>
+              <a:t>27.01.2020</a:t>
             </a:fld>
             <a:endParaRPr lang="fr-CH"/>
           </a:p>
@@ -1213,7 +1213,7 @@
           <a:p>
             <a:fld id="{8AC31CE9-DC4A-423F-9343-8758E8045185}" type="datetimeFigureOut">
               <a:rPr lang="en-GB" smtClean="0"/>
-              <a:t>26/01/2020</a:t>
+              <a:t>27/01/2020</a:t>
             </a:fld>
             <a:endParaRPr lang="en-GB"/>
           </a:p>
@@ -1413,7 +1413,7 @@
           <a:p>
             <a:fld id="{8AC31CE9-DC4A-423F-9343-8758E8045185}" type="datetimeFigureOut">
               <a:rPr lang="en-GB" smtClean="0"/>
-              <a:t>26/01/2020</a:t>
+              <a:t>27/01/2020</a:t>
             </a:fld>
             <a:endParaRPr lang="en-GB"/>
           </a:p>
@@ -1623,7 +1623,7 @@
           <a:p>
             <a:fld id="{8AC31CE9-DC4A-423F-9343-8758E8045185}" type="datetimeFigureOut">
               <a:rPr lang="en-GB" smtClean="0"/>
-              <a:t>26/01/2020</a:t>
+              <a:t>27/01/2020</a:t>
             </a:fld>
             <a:endParaRPr lang="en-GB"/>
           </a:p>
@@ -1823,7 +1823,7 @@
           <a:p>
             <a:fld id="{8AC31CE9-DC4A-423F-9343-8758E8045185}" type="datetimeFigureOut">
               <a:rPr lang="en-GB" smtClean="0"/>
-              <a:t>26/01/2020</a:t>
+              <a:t>27/01/2020</a:t>
             </a:fld>
             <a:endParaRPr lang="en-GB"/>
           </a:p>
@@ -2099,7 +2099,7 @@
           <a:p>
             <a:fld id="{8AC31CE9-DC4A-423F-9343-8758E8045185}" type="datetimeFigureOut">
               <a:rPr lang="en-GB" smtClean="0"/>
-              <a:t>26/01/2020</a:t>
+              <a:t>27/01/2020</a:t>
             </a:fld>
             <a:endParaRPr lang="en-GB"/>
           </a:p>
@@ -2367,7 +2367,7 @@
           <a:p>
             <a:fld id="{8AC31CE9-DC4A-423F-9343-8758E8045185}" type="datetimeFigureOut">
               <a:rPr lang="en-GB" smtClean="0"/>
-              <a:t>26/01/2020</a:t>
+              <a:t>27/01/2020</a:t>
             </a:fld>
             <a:endParaRPr lang="en-GB"/>
           </a:p>
@@ -2782,7 +2782,7 @@
           <a:p>
             <a:fld id="{8AC31CE9-DC4A-423F-9343-8758E8045185}" type="datetimeFigureOut">
               <a:rPr lang="en-GB" smtClean="0"/>
-              <a:t>26/01/2020</a:t>
+              <a:t>27/01/2020</a:t>
             </a:fld>
             <a:endParaRPr lang="en-GB"/>
           </a:p>
@@ -2924,7 +2924,7 @@
           <a:p>
             <a:fld id="{8AC31CE9-DC4A-423F-9343-8758E8045185}" type="datetimeFigureOut">
               <a:rPr lang="en-GB" smtClean="0"/>
-              <a:t>26/01/2020</a:t>
+              <a:t>27/01/2020</a:t>
             </a:fld>
             <a:endParaRPr lang="en-GB"/>
           </a:p>
@@ -3037,7 +3037,7 @@
           <a:p>
             <a:fld id="{8AC31CE9-DC4A-423F-9343-8758E8045185}" type="datetimeFigureOut">
               <a:rPr lang="en-GB" smtClean="0"/>
-              <a:t>26/01/2020</a:t>
+              <a:t>27/01/2020</a:t>
             </a:fld>
             <a:endParaRPr lang="en-GB"/>
           </a:p>
@@ -3350,7 +3350,7 @@
           <a:p>
             <a:fld id="{8AC31CE9-DC4A-423F-9343-8758E8045185}" type="datetimeFigureOut">
               <a:rPr lang="en-GB" smtClean="0"/>
-              <a:t>26/01/2020</a:t>
+              <a:t>27/01/2020</a:t>
             </a:fld>
             <a:endParaRPr lang="en-GB"/>
           </a:p>
@@ -3639,7 +3639,7 @@
           <a:p>
             <a:fld id="{8AC31CE9-DC4A-423F-9343-8758E8045185}" type="datetimeFigureOut">
               <a:rPr lang="en-GB" smtClean="0"/>
-              <a:t>26/01/2020</a:t>
+              <a:t>27/01/2020</a:t>
             </a:fld>
             <a:endParaRPr lang="en-GB"/>
           </a:p>
@@ -3882,7 +3882,7 @@
           <a:p>
             <a:fld id="{8AC31CE9-DC4A-423F-9343-8758E8045185}" type="datetimeFigureOut">
               <a:rPr lang="en-GB" smtClean="0"/>
-              <a:t>26/01/2020</a:t>
+              <a:t>27/01/2020</a:t>
             </a:fld>
             <a:endParaRPr lang="en-GB"/>
           </a:p>
@@ -6469,8 +6469,8 @@
         </p:nvSpPr>
         <p:spPr>
           <a:xfrm>
-            <a:off x="123825" y="1600200"/>
-            <a:ext cx="5781675" cy="5170646"/>
+            <a:off x="108902" y="2691260"/>
+            <a:ext cx="5781675" cy="4062651"/>
           </a:xfrm>
           <a:prstGeom prst="rect">
             <a:avLst/>
@@ -6482,155 +6482,6 @@
             <a:spAutoFit/>
           </a:bodyPr>
           <a:lstStyle/>
-          <a:p>
-            <a:r>
-              <a:rPr lang="fr-CH" b="1" dirty="0">
-                <a:solidFill>
-                  <a:srgbClr val="003300"/>
-                </a:solidFill>
-              </a:rPr>
-              <a:t>gai </a:t>
-            </a:r>
-            <a:r>
-              <a:rPr lang="fr-CH" b="1" dirty="0" err="1">
-                <a:solidFill>
-                  <a:srgbClr val="003300"/>
-                </a:solidFill>
-              </a:rPr>
-              <a:t>phenotype</a:t>
-            </a:r>
-            <a:r>
-              <a:rPr lang="fr-CH" b="1" dirty="0">
-                <a:solidFill>
-                  <a:srgbClr val="003300"/>
-                </a:solidFill>
-              </a:rPr>
-              <a:t> </a:t>
-            </a:r>
-            <a:r>
-              <a:rPr lang="fr-CH" dirty="0">
-                <a:solidFill>
-                  <a:srgbClr val="003300"/>
-                </a:solidFill>
-              </a:rPr>
-              <a:t>: 51bp </a:t>
-            </a:r>
-            <a:r>
-              <a:rPr lang="fr-CH" dirty="0" err="1">
-                <a:solidFill>
-                  <a:srgbClr val="003300"/>
-                </a:solidFill>
-              </a:rPr>
-              <a:t>deletion</a:t>
-            </a:r>
-            <a:r>
-              <a:rPr lang="fr-CH" dirty="0">
-                <a:solidFill>
-                  <a:srgbClr val="003300"/>
-                </a:solidFill>
-              </a:rPr>
-              <a:t> in DELLA </a:t>
-            </a:r>
-            <a:r>
-              <a:rPr lang="fr-CH" dirty="0" err="1">
-                <a:solidFill>
-                  <a:srgbClr val="003300"/>
-                </a:solidFill>
-              </a:rPr>
-              <a:t>domain</a:t>
-            </a:r>
-            <a:r>
-              <a:rPr lang="fr-CH" dirty="0">
-                <a:solidFill>
-                  <a:srgbClr val="003300"/>
-                </a:solidFill>
-              </a:rPr>
-              <a:t> -&gt; </a:t>
-            </a:r>
-            <a:r>
-              <a:rPr lang="fr-CH" u="sng" dirty="0">
-                <a:solidFill>
-                  <a:srgbClr val="003300"/>
-                </a:solidFill>
-              </a:rPr>
-              <a:t>no </a:t>
-            </a:r>
-            <a:r>
-              <a:rPr lang="fr-CH" u="sng" dirty="0" err="1">
-                <a:solidFill>
-                  <a:srgbClr val="003300"/>
-                </a:solidFill>
-              </a:rPr>
-              <a:t>growth</a:t>
-            </a:r>
-            <a:endParaRPr lang="fr-CH" u="sng" dirty="0">
-              <a:solidFill>
-                <a:srgbClr val="003300"/>
-              </a:solidFill>
-            </a:endParaRPr>
-          </a:p>
-          <a:p>
-            <a:endParaRPr lang="fr-CH" dirty="0">
-              <a:solidFill>
-                <a:srgbClr val="003300"/>
-              </a:solidFill>
-            </a:endParaRPr>
-          </a:p>
-          <a:p>
-            <a:r>
-              <a:rPr lang="fr-CH" b="1" dirty="0" err="1">
-                <a:solidFill>
-                  <a:srgbClr val="003300"/>
-                </a:solidFill>
-              </a:rPr>
-              <a:t>gar</a:t>
-            </a:r>
-            <a:r>
-              <a:rPr lang="fr-CH" b="1" dirty="0">
-                <a:solidFill>
-                  <a:srgbClr val="003300"/>
-                </a:solidFill>
-              </a:rPr>
-              <a:t> (gai revertant)</a:t>
-            </a:r>
-            <a:r>
-              <a:rPr lang="fr-CH" dirty="0">
-                <a:solidFill>
-                  <a:srgbClr val="003300"/>
-                </a:solidFill>
-              </a:rPr>
-              <a:t>: have the 51bp </a:t>
-            </a:r>
-            <a:r>
-              <a:rPr lang="fr-CH" dirty="0" err="1">
-                <a:solidFill>
-                  <a:srgbClr val="003300"/>
-                </a:solidFill>
-              </a:rPr>
-              <a:t>deletion</a:t>
-            </a:r>
-            <a:r>
-              <a:rPr lang="fr-CH" dirty="0">
-                <a:solidFill>
-                  <a:srgbClr val="003300"/>
-                </a:solidFill>
-              </a:rPr>
-              <a:t> but </a:t>
-            </a:r>
-            <a:r>
-              <a:rPr lang="fr-CH" u="sng" dirty="0" err="1">
-                <a:solidFill>
-                  <a:srgbClr val="003300"/>
-                </a:solidFill>
-              </a:rPr>
-              <a:t>grow</a:t>
-            </a:r>
-            <a:endParaRPr lang="fr-CH" b="1" u="sng" dirty="0">
-              <a:solidFill>
-                <a:srgbClr val="003300"/>
-              </a:solidFill>
-            </a:endParaRPr>
-          </a:p>
           <a:p>
             <a:endParaRPr lang="en-GB" u="sng" dirty="0">
               <a:solidFill>
@@ -7493,6 +7344,187 @@
               <a:rPr lang="en-GB" sz="1200" dirty="0"/>
               <a:t>Thibault Schowing, BC.7107, HS2019</a:t>
             </a:r>
+          </a:p>
+        </p:txBody>
+      </p:sp>
+      <p:sp>
+        <p:nvSpPr>
+          <p:cNvPr id="12" name="ZoneTexte 11">
+            <a:extLst>
+              <a:ext uri="{FF2B5EF4-FFF2-40B4-BE49-F238E27FC236}">
+                <a16:creationId xmlns:a16="http://schemas.microsoft.com/office/drawing/2014/main" id="{827F5222-726A-4F15-ACBD-C8388CDB4BFC}"/>
+              </a:ext>
+            </a:extLst>
+          </p:cNvPr>
+          <p:cNvSpPr txBox="1"/>
+          <p:nvPr/>
+        </p:nvSpPr>
+        <p:spPr>
+          <a:xfrm>
+            <a:off x="236491" y="1701419"/>
+            <a:ext cx="6162551" cy="1200329"/>
+          </a:xfrm>
+          <a:prstGeom prst="rect">
+            <a:avLst/>
+          </a:prstGeom>
+          <a:noFill/>
+        </p:spPr>
+        <p:txBody>
+          <a:bodyPr wrap="square" rtlCol="0">
+            <a:spAutoFit/>
+          </a:bodyPr>
+          <a:lstStyle/>
+          <a:p>
+            <a:r>
+              <a:rPr lang="fr-CH" b="1" dirty="0">
+                <a:solidFill>
+                  <a:srgbClr val="003300"/>
+                </a:solidFill>
+              </a:rPr>
+              <a:t>gai </a:t>
+            </a:r>
+            <a:r>
+              <a:rPr lang="fr-CH" b="1" dirty="0" err="1">
+                <a:solidFill>
+                  <a:srgbClr val="003300"/>
+                </a:solidFill>
+              </a:rPr>
+              <a:t>phenotype</a:t>
+            </a:r>
+            <a:r>
+              <a:rPr lang="fr-CH" b="1" dirty="0">
+                <a:solidFill>
+                  <a:srgbClr val="003300"/>
+                </a:solidFill>
+              </a:rPr>
+              <a:t> </a:t>
+            </a:r>
+            <a:r>
+              <a:rPr lang="fr-CH" dirty="0">
+                <a:solidFill>
+                  <a:srgbClr val="003300"/>
+                </a:solidFill>
+              </a:rPr>
+              <a:t>: 51bp </a:t>
+            </a:r>
+            <a:r>
+              <a:rPr lang="fr-CH" dirty="0" err="1">
+                <a:solidFill>
+                  <a:srgbClr val="003300"/>
+                </a:solidFill>
+              </a:rPr>
+              <a:t>deletion</a:t>
+            </a:r>
+            <a:r>
+              <a:rPr lang="fr-CH" dirty="0">
+                <a:solidFill>
+                  <a:srgbClr val="003300"/>
+                </a:solidFill>
+              </a:rPr>
+              <a:t> in DELLA </a:t>
+            </a:r>
+            <a:r>
+              <a:rPr lang="fr-CH" dirty="0" err="1">
+                <a:solidFill>
+                  <a:srgbClr val="003300"/>
+                </a:solidFill>
+              </a:rPr>
+              <a:t>domain</a:t>
+            </a:r>
+            <a:r>
+              <a:rPr lang="fr-CH" dirty="0">
+                <a:solidFill>
+                  <a:srgbClr val="003300"/>
+                </a:solidFill>
+              </a:rPr>
+              <a:t> -&gt; </a:t>
+            </a:r>
+            <a:r>
+              <a:rPr lang="fr-CH" u="sng" dirty="0">
+                <a:solidFill>
+                  <a:srgbClr val="003300"/>
+                </a:solidFill>
+              </a:rPr>
+              <a:t>no </a:t>
+            </a:r>
+            <a:r>
+              <a:rPr lang="fr-CH" u="sng" dirty="0" err="1">
+                <a:solidFill>
+                  <a:srgbClr val="003300"/>
+                </a:solidFill>
+              </a:rPr>
+              <a:t>growth</a:t>
+            </a:r>
+            <a:endParaRPr lang="fr-CH" u="sng" dirty="0">
+              <a:solidFill>
+                <a:srgbClr val="003300"/>
+              </a:solidFill>
+            </a:endParaRPr>
+          </a:p>
+          <a:p>
+            <a:endParaRPr lang="fr-CH" dirty="0">
+              <a:solidFill>
+                <a:srgbClr val="003300"/>
+              </a:solidFill>
+            </a:endParaRPr>
+          </a:p>
+          <a:p>
+            <a:r>
+              <a:rPr lang="fr-CH" b="1" dirty="0" err="1">
+                <a:solidFill>
+                  <a:srgbClr val="003300"/>
+                </a:solidFill>
+              </a:rPr>
+              <a:t>gar</a:t>
+            </a:r>
+            <a:r>
+              <a:rPr lang="fr-CH" b="1" dirty="0">
+                <a:solidFill>
+                  <a:srgbClr val="003300"/>
+                </a:solidFill>
+              </a:rPr>
+              <a:t> (gai revertant)</a:t>
+            </a:r>
+            <a:r>
+              <a:rPr lang="fr-CH" dirty="0">
+                <a:solidFill>
+                  <a:srgbClr val="003300"/>
+                </a:solidFill>
+              </a:rPr>
+              <a:t>: have the 51bp </a:t>
+            </a:r>
+            <a:r>
+              <a:rPr lang="fr-CH" dirty="0" err="1">
+                <a:solidFill>
+                  <a:srgbClr val="003300"/>
+                </a:solidFill>
+              </a:rPr>
+              <a:t>deletion</a:t>
+            </a:r>
+            <a:r>
+              <a:rPr lang="fr-CH" dirty="0">
+                <a:solidFill>
+                  <a:srgbClr val="003300"/>
+                </a:solidFill>
+              </a:rPr>
+              <a:t> but </a:t>
+            </a:r>
+            <a:r>
+              <a:rPr lang="fr-CH" u="sng" dirty="0" err="1">
+                <a:solidFill>
+                  <a:srgbClr val="003300"/>
+                </a:solidFill>
+              </a:rPr>
+              <a:t>grow</a:t>
+            </a:r>
+            <a:endParaRPr lang="fr-CH" b="1" u="sng" dirty="0">
+              <a:solidFill>
+                <a:srgbClr val="003300"/>
+              </a:solidFill>
+            </a:endParaRPr>
+          </a:p>
+          <a:p>
+            <a:endParaRPr lang="fr-CH" dirty="0"/>
           </a:p>
         </p:txBody>
       </p:sp>
@@ -7876,8 +7908,8 @@
           </a:stretch>
         </p:blipFill>
         <p:spPr>
-          <a:xfrm>
-            <a:off x="1878846" y="4207736"/>
+          <a:xfrm rot="5400000">
+            <a:off x="1868894" y="4233134"/>
             <a:ext cx="976230" cy="976230"/>
           </a:xfrm>
           <a:prstGeom prst="rect">
@@ -7907,7 +7939,7 @@
         </p:blipFill>
         <p:spPr>
           <a:xfrm>
-            <a:off x="1878846" y="5285000"/>
+            <a:off x="1868894" y="5223107"/>
             <a:ext cx="976230" cy="976230"/>
           </a:xfrm>
           <a:prstGeom prst="rect">
@@ -8107,8 +8139,8 @@
         </p:blipFill>
         <p:spPr>
           <a:xfrm>
-            <a:off x="5712164" y="3045576"/>
-            <a:ext cx="1011821" cy="1651954"/>
+            <a:off x="5946943" y="4170471"/>
+            <a:ext cx="561881" cy="917357"/>
           </a:xfrm>
           <a:prstGeom prst="rect">
             <a:avLst/>
@@ -8761,9 +8793,9 @@
           </a:stretch>
         </p:blipFill>
         <p:spPr>
-          <a:xfrm>
-            <a:off x="5299938" y="4180224"/>
-            <a:ext cx="1836274" cy="1709635"/>
+          <a:xfrm rot="1192653">
+            <a:off x="5517418" y="4758190"/>
+            <a:ext cx="1185243" cy="1103502"/>
           </a:xfrm>
           <a:prstGeom prst="rect">
             <a:avLst/>

</xml_diff>